<commit_message>
updated slides with tinyurls
</commit_message>
<xml_diff>
--- a/slides.pptx
+++ b/slides.pptx
@@ -3458,15 +3458,7 @@
                   <a:schemeClr val="accent1"/>
                 </a:solidFill>
               </a:rPr>
-              <a:t>Session leader and content created by: Kelsey </a:t>
-            </a:r>
-            <a:r>
-              <a:rPr lang="en-US" dirty="0" smtClean="0">
-                <a:solidFill>
-                  <a:schemeClr val="accent1"/>
-                </a:solidFill>
-              </a:rPr>
-              <a:t>Chatlosh @</a:t>
+              <a:t>Session leader and content created by: Kelsey Chatlosh @</a:t>
             </a:r>
             <a:r>
               <a:rPr lang="en-US" dirty="0" err="1" smtClean="0">
@@ -3489,7 +3481,15 @@
                   <a:schemeClr val="accent1"/>
                 </a:solidFill>
               </a:rPr>
-              <a:t>Edited by: Patrick Sweeney </a:t>
+              <a:t>Edited by: Patrick Sweeney @</a:t>
+            </a:r>
+            <a:r>
+              <a:rPr lang="en-US" dirty="0" err="1" smtClean="0">
+                <a:solidFill>
+                  <a:schemeClr val="accent1"/>
+                </a:solidFill>
+              </a:rPr>
+              <a:t>pswee</a:t>
             </a:r>
             <a:r>
               <a:rPr lang="en-US" dirty="0" smtClean="0">
@@ -3497,45 +3497,8 @@
                   <a:schemeClr val="accent1"/>
                 </a:solidFill>
               </a:rPr>
-              <a:t>@</a:t>
-            </a:r>
-            <a:r>
-              <a:rPr lang="en-US" dirty="0" err="1" smtClean="0">
-                <a:solidFill>
-                  <a:schemeClr val="accent1"/>
-                </a:solidFill>
-              </a:rPr>
-              <a:t>pswee</a:t>
-            </a:r>
-            <a:r>
-              <a:rPr lang="en-US" dirty="0" smtClean="0">
-                <a:solidFill>
-                  <a:schemeClr val="accent1"/>
-                </a:solidFill>
-              </a:rPr>
-              <a:t> and </a:t>
-            </a:r>
-            <a:r>
-              <a:rPr lang="en-US" dirty="0" smtClean="0">
-                <a:solidFill>
-                  <a:schemeClr val="accent1"/>
-                </a:solidFill>
-              </a:rPr>
-              <a:t>Patrick </a:t>
-            </a:r>
-            <a:r>
-              <a:rPr lang="en-US" dirty="0" smtClean="0">
-                <a:solidFill>
-                  <a:schemeClr val="accent1"/>
-                </a:solidFill>
-              </a:rPr>
-              <a:t>Smyth @psmyth01</a:t>
-            </a:r>
-            <a:endParaRPr lang="en-US" dirty="0" smtClean="0">
-              <a:solidFill>
-                <a:schemeClr val="accent1"/>
-              </a:solidFill>
-            </a:endParaRPr>
+              <a:t> and Patrick Smyth @psmyth01</a:t>
+            </a:r>
           </a:p>
           <a:p>
             <a:r>
@@ -3658,8 +3621,8 @@
         </p:nvSpPr>
         <p:spPr>
           <a:xfrm>
-            <a:off x="1523999" y="2165100"/>
-            <a:ext cx="9144000" cy="2387600"/>
+            <a:off x="761998" y="2025400"/>
+            <a:ext cx="10668001" cy="2387600"/>
           </a:xfrm>
         </p:spPr>
         <p:txBody>
@@ -3688,7 +3651,55 @@
             </a:r>
             <a:r>
               <a:rPr lang="en-US" dirty="0"/>
-              <a:t> for a great definition of consent</a:t>
+              <a:t> </a:t>
+            </a:r>
+            <a:r>
+              <a:rPr lang="en-US" dirty="0" smtClean="0">
+                <a:solidFill>
+                  <a:srgbClr val="FFF8A9"/>
+                </a:solidFill>
+              </a:rPr>
+              <a:t>[</a:t>
+            </a:r>
+            <a:r>
+              <a:rPr lang="en-US" dirty="0" err="1" smtClean="0">
+                <a:solidFill>
+                  <a:srgbClr val="FFF8A9"/>
+                </a:solidFill>
+              </a:rPr>
+              <a:t>tinyurl.com</a:t>
+            </a:r>
+            <a:r>
+              <a:rPr lang="en-US" dirty="0" smtClean="0">
+                <a:solidFill>
+                  <a:srgbClr val="FFF8A9"/>
+                </a:solidFill>
+              </a:rPr>
+              <a:t>/</a:t>
+            </a:r>
+            <a:r>
+              <a:rPr lang="en-US" dirty="0" err="1" smtClean="0">
+                <a:solidFill>
+                  <a:srgbClr val="FFF8A9"/>
+                </a:solidFill>
+              </a:rPr>
+              <a:t>consentpp</a:t>
+            </a:r>
+            <a:r>
+              <a:rPr lang="en-US" dirty="0" smtClean="0">
+                <a:solidFill>
+                  <a:srgbClr val="FFF8A9"/>
+                </a:solidFill>
+              </a:rPr>
+              <a:t>]</a:t>
+            </a:r>
+            <a:r>
+              <a:rPr lang="en-US" dirty="0" smtClean="0"/>
+              <a:t> for </a:t>
+            </a:r>
+            <a:r>
+              <a:rPr lang="en-US" dirty="0"/>
+              <a:t>a great definition of consent</a:t>
             </a:r>
           </a:p>
         </p:txBody>
@@ -3728,15 +3739,7 @@
                   <a:schemeClr val="accent5"/>
                 </a:solidFill>
               </a:rPr>
-              <a:t>belmont</a:t>
-            </a:r>
-            <a:r>
-              <a:rPr lang="en-US" dirty="0" err="1" smtClean="0">
-                <a:solidFill>
-                  <a:schemeClr val="accent5"/>
-                </a:solidFill>
-              </a:rPr>
-              <a:t>.md</a:t>
+              <a:t>belmont.md</a:t>
             </a:r>
             <a:r>
               <a:rPr lang="en-US" dirty="0" smtClean="0">
@@ -4072,11 +4075,7 @@
             <a:pPr algn="ctr"/>
             <a:r>
               <a:rPr lang="en-US" dirty="0" smtClean="0"/>
-              <a:t>*A </a:t>
-            </a:r>
-            <a:r>
-              <a:rPr lang="en-US" dirty="0" smtClean="0"/>
-              <a:t>note on formal methods</a:t>
+              <a:t>*A note on formal methods</a:t>
             </a:r>
             <a:endParaRPr lang="en-US" dirty="0"/>
           </a:p>
@@ -4243,10 +4242,6 @@
               <a:rPr lang="en-US" sz="3100" dirty="0" smtClean="0"/>
               <a:t>discuss:</a:t>
             </a:r>
-            <a:r>
-              <a:rPr lang="en-US" sz="3100" dirty="0" smtClean="0"/>
-              <a:t/>
-            </a:r>
             <a:br>
               <a:rPr lang="en-US" sz="3100" dirty="0" smtClean="0"/>
             </a:br>
@@ -4267,19 +4262,7 @@
             </a:r>
             <a:r>
               <a:rPr lang="en-US" sz="3100" dirty="0" smtClean="0"/>
-              <a:t> of </a:t>
-            </a:r>
-            <a:r>
-              <a:rPr lang="en-US" sz="3100" dirty="0" smtClean="0"/>
-              <a:t>your project—</a:t>
-            </a:r>
-            <a:r>
-              <a:rPr lang="en-US" sz="3100" dirty="0" smtClean="0"/>
-              <a:t>what </a:t>
-            </a:r>
-            <a:r>
-              <a:rPr lang="en-US" sz="3100" dirty="0" smtClean="0"/>
-              <a:t>does it </a:t>
+              <a:t> of your project—what does it </a:t>
             </a:r>
             <a:r>
               <a:rPr lang="en-US" sz="3100" i="1" dirty="0" smtClean="0"/>
@@ -4317,11 +4300,7 @@
             </a:r>
             <a:r>
               <a:rPr lang="en-US" sz="3100" dirty="0" smtClean="0"/>
-              <a:t> of your </a:t>
-            </a:r>
-            <a:r>
-              <a:rPr lang="en-US" sz="3100" dirty="0" smtClean="0"/>
-              <a:t>project—</a:t>
+              <a:t> of your project—</a:t>
             </a:r>
             <a:r>
               <a:rPr lang="en-US" sz="3100" i="1" dirty="0" smtClean="0"/>
@@ -4343,27 +4322,7 @@
             </a:br>
             <a:r>
               <a:rPr lang="en-US" sz="3100" dirty="0" smtClean="0"/>
-              <a:t>&gt;&gt;  In </a:t>
-            </a:r>
-            <a:r>
-              <a:rPr lang="en-US" sz="3100" dirty="0" smtClean="0"/>
-              <a:t>relation to </a:t>
-            </a:r>
-            <a:r>
-              <a:rPr lang="en-US" sz="3100" dirty="0" smtClean="0"/>
-              <a:t>each of your projects' </a:t>
-            </a:r>
-            <a:r>
-              <a:rPr lang="en-US" sz="3100" dirty="0" smtClean="0"/>
-              <a:t>purpose and design, what might be some ethical concerns that fall beyond questions of legality or the purview of the </a:t>
-            </a:r>
-            <a:r>
-              <a:rPr lang="en-US" sz="3100" dirty="0" smtClean="0"/>
-              <a:t>IRB?</a:t>
-            </a:r>
-            <a:r>
-              <a:rPr lang="en-US" sz="3100" dirty="0" smtClean="0"/>
-              <a:t/>
+              <a:t>&gt;&gt;  In relation to each of your projects' purpose and design, what might be some ethical concerns that fall beyond questions of legality or the purview of the IRB?</a:t>
             </a:r>
             <a:br>
               <a:rPr lang="en-US" sz="3100" dirty="0" smtClean="0"/>
@@ -4531,15 +4490,15 @@
         </p:nvSpPr>
         <p:spPr>
           <a:xfrm>
-            <a:off x="5630779" y="3565541"/>
-            <a:ext cx="6096000" cy="1569660"/>
+            <a:off x="3965074" y="3565541"/>
+            <a:ext cx="7761705" cy="2308324"/>
           </a:xfrm>
           <a:prstGeom prst="rect">
             <a:avLst/>
           </a:prstGeom>
         </p:spPr>
         <p:txBody>
-          <a:bodyPr>
+          <a:bodyPr wrap="square">
             <a:spAutoFit/>
           </a:bodyPr>
           <a:lstStyle/>
@@ -4554,7 +4513,55 @@
             </a:br>
             <a:r>
               <a:rPr lang="en-US" sz="4800" dirty="0" smtClean="0"/>
-              <a:t>(Markham 2016)</a:t>
+              <a:t>(Markham </a:t>
+            </a:r>
+            <a:r>
+              <a:rPr lang="en-US" sz="4800" dirty="0" smtClean="0"/>
+              <a:t>2016 </a:t>
+            </a:r>
+            <a:r>
+              <a:rPr lang="en-US" sz="4800" dirty="0" smtClean="0">
+                <a:solidFill>
+                  <a:srgbClr val="FFF8A9"/>
+                </a:solidFill>
+              </a:rPr>
+              <a:t>[</a:t>
+            </a:r>
+            <a:r>
+              <a:rPr lang="en-US" sz="4800" dirty="0" err="1" smtClean="0">
+                <a:solidFill>
+                  <a:srgbClr val="FFF8A9"/>
+                </a:solidFill>
+              </a:rPr>
+              <a:t>tinyurl.com</a:t>
+            </a:r>
+            <a:r>
+              <a:rPr lang="en-US" sz="4800" dirty="0" smtClean="0">
+                <a:solidFill>
+                  <a:srgbClr val="FFF8A9"/>
+                </a:solidFill>
+              </a:rPr>
+              <a:t>/</a:t>
+            </a:r>
+            <a:r>
+              <a:rPr lang="en-US" sz="4800" dirty="0" err="1" smtClean="0">
+                <a:solidFill>
+                  <a:srgbClr val="FFF8A9"/>
+                </a:solidFill>
+              </a:rPr>
+              <a:t>markhamethics</a:t>
+            </a:r>
+            <a:r>
+              <a:rPr lang="en-US" sz="4800" dirty="0" smtClean="0">
+                <a:solidFill>
+                  <a:srgbClr val="FFF8A9"/>
+                </a:solidFill>
+              </a:rPr>
+              <a:t>]</a:t>
+            </a:r>
+            <a:r>
+              <a:rPr lang="en-US" sz="4800" dirty="0" smtClean="0"/>
+              <a:t>)</a:t>
             </a:r>
             <a:endParaRPr lang="en-US" sz="4800" dirty="0"/>
           </a:p>
@@ -4568,7 +4575,7 @@
         </p:nvCxnSpPr>
         <p:spPr>
           <a:xfrm>
-            <a:off x="4523874" y="4025065"/>
+            <a:off x="3723774" y="3989973"/>
             <a:ext cx="1106905" cy="0"/>
           </a:xfrm>
           <a:prstGeom prst="straightConnector1">
@@ -4877,11 +4884,7 @@
             </a:pPr>
             <a:r>
               <a:rPr lang="en-US" sz="3200" dirty="0" smtClean="0"/>
-              <a:t>&gt;&gt;  </a:t>
-            </a:r>
-            <a:r>
-              <a:rPr lang="en-US" sz="3200" dirty="0" smtClean="0"/>
-              <a:t>to </a:t>
+              <a:t>&gt;&gt;  to </a:t>
             </a:r>
             <a:r>
               <a:rPr lang="en-US" sz="3200" dirty="0"/>
@@ -4898,11 +4901,7 @@
             </a:pPr>
             <a:r>
               <a:rPr lang="en-US" sz="3200" dirty="0" smtClean="0"/>
-              <a:t>&gt;&gt;  </a:t>
-            </a:r>
-            <a:r>
-              <a:rPr lang="en-US" sz="3200" dirty="0" smtClean="0"/>
-              <a:t>to </a:t>
+              <a:t>&gt;&gt;  to </a:t>
             </a:r>
             <a:r>
               <a:rPr lang="en-US" sz="3200" dirty="0"/>
@@ -4919,11 +4918,7 @@
             </a:pPr>
             <a:r>
               <a:rPr lang="en-US" sz="3200" dirty="0" smtClean="0"/>
-              <a:t>&gt;&gt;  </a:t>
-            </a:r>
-            <a:r>
-              <a:rPr lang="en-US" sz="3200" dirty="0" smtClean="0"/>
-              <a:t>in </a:t>
+              <a:t>&gt;&gt;  in </a:t>
             </a:r>
             <a:r>
               <a:rPr lang="en-US" sz="3200" dirty="0"/>
@@ -5578,7 +5573,6 @@
               <a:rPr lang="en-US" sz="3200" dirty="0" smtClean="0"/>
               <a:t> 2012 report)</a:t>
             </a:r>
-            <a:endParaRPr lang="en-US" sz="3200" dirty="0" smtClean="0"/>
           </a:p>
         </p:txBody>
       </p:sp>
@@ -6092,8 +6086,8 @@
         </p:nvSpPr>
         <p:spPr>
           <a:xfrm>
-            <a:off x="831850" y="1934328"/>
-            <a:ext cx="10515600" cy="2852737"/>
+            <a:off x="638175" y="1934328"/>
+            <a:ext cx="10902950" cy="2852737"/>
           </a:xfrm>
         </p:spPr>
         <p:txBody>
@@ -6140,33 +6134,117 @@
             </a:br>
             <a:r>
               <a:rPr lang="en-US" sz="2400" dirty="0" smtClean="0"/>
-              <a:t>Review</a:t>
+              <a:t>Review </a:t>
+            </a:r>
+            <a:r>
+              <a:rPr lang="en-US" sz="2400" dirty="0">
+                <a:hlinkClick r:id="rId2"/>
+              </a:rPr>
+              <a:t>Joshua Tabak and Vivian Zayas's academic article</a:t>
+            </a:r>
+            <a:r>
+              <a:rPr lang="en-US" sz="2400" dirty="0"/>
+              <a:t> </a:t>
+            </a:r>
+            <a:r>
+              <a:rPr lang="en-US" sz="2400" dirty="0" smtClean="0">
+                <a:solidFill>
+                  <a:srgbClr val="FFF8A9"/>
+                </a:solidFill>
+              </a:rPr>
+              <a:t>[</a:t>
+            </a:r>
+            <a:r>
+              <a:rPr lang="en-US" sz="2400" dirty="0" err="1" smtClean="0">
+                <a:solidFill>
+                  <a:srgbClr val="FFF8A9"/>
+                </a:solidFill>
+              </a:rPr>
+              <a:t>tinyurl.com</a:t>
+            </a:r>
+            <a:r>
+              <a:rPr lang="en-US" sz="2400" dirty="0" smtClean="0">
+                <a:solidFill>
+                  <a:srgbClr val="FFF8A9"/>
+                </a:solidFill>
+              </a:rPr>
+              <a:t>/</a:t>
+            </a:r>
+            <a:r>
+              <a:rPr lang="en-US" sz="2400" dirty="0" err="1" smtClean="0">
+                <a:solidFill>
+                  <a:srgbClr val="FFF8A9"/>
+                </a:solidFill>
+              </a:rPr>
+              <a:t>tabakzayas</a:t>
+            </a:r>
+            <a:r>
+              <a:rPr lang="en-US" sz="2400" dirty="0" smtClean="0">
+                <a:solidFill>
+                  <a:srgbClr val="FFF8A9"/>
+                </a:solidFill>
+              </a:rPr>
+              <a:t>] </a:t>
+            </a:r>
+            <a:r>
+              <a:rPr lang="en-US" sz="2400" dirty="0" smtClean="0"/>
+              <a:t>and </a:t>
+            </a:r>
+            <a:r>
+              <a:rPr lang="en-US" sz="2400" dirty="0">
+                <a:hlinkClick r:id="rId3"/>
+              </a:rPr>
+              <a:t>their summary of it for the New York </a:t>
+            </a:r>
+            <a:r>
+              <a:rPr lang="en-US" sz="2400" dirty="0" smtClean="0">
+                <a:hlinkClick r:id="rId3"/>
+              </a:rPr>
+              <a:t>Times</a:t>
             </a:r>
             <a:r>
               <a:rPr lang="en-US" sz="2400" dirty="0" smtClean="0"/>
               <a:t> </a:t>
             </a:r>
             <a:r>
-              <a:rPr lang="en-US" sz="2400" dirty="0">
-                <a:hlinkClick r:id="rId2"/>
-              </a:rPr>
-              <a:t>Joshua Tabak and Vivian Zayas's academic article</a:t>
-            </a:r>
-            <a:r>
-              <a:rPr lang="en-US" sz="2400" dirty="0"/>
-              <a:t> and </a:t>
-            </a:r>
-            <a:r>
-              <a:rPr lang="en-US" sz="2400" dirty="0">
-                <a:hlinkClick r:id="rId3"/>
-              </a:rPr>
-              <a:t>their summary of it for the New York </a:t>
-            </a:r>
-            <a:r>
               <a:rPr lang="en-US" sz="2400" dirty="0" smtClean="0">
-                <a:hlinkClick r:id="rId3"/>
-              </a:rPr>
-              <a:t>Times</a:t>
+                <a:solidFill>
+                  <a:srgbClr val="FFF8A9"/>
+                </a:solidFill>
+              </a:rPr>
+              <a:t>[</a:t>
+            </a:r>
+            <a:r>
+              <a:rPr lang="en-US" sz="2400" dirty="0" err="1" smtClean="0">
+                <a:solidFill>
+                  <a:srgbClr val="FFF8A9"/>
+                </a:solidFill>
+              </a:rPr>
+              <a:t>tinyurl.com</a:t>
+            </a:r>
+            <a:r>
+              <a:rPr lang="en-US" sz="2400" dirty="0" smtClean="0">
+                <a:solidFill>
+                  <a:srgbClr val="FFF8A9"/>
+                </a:solidFill>
+              </a:rPr>
+              <a:t>/</a:t>
+            </a:r>
+            <a:r>
+              <a:rPr lang="en-US" sz="2400" dirty="0" err="1" smtClean="0">
+                <a:solidFill>
+                  <a:srgbClr val="FFF8A9"/>
+                </a:solidFill>
+              </a:rPr>
+              <a:t>gaydarscience</a:t>
+            </a:r>
+            <a:r>
+              <a:rPr lang="en-US" sz="2400" dirty="0" smtClean="0">
+                <a:solidFill>
+                  <a:srgbClr val="FFF8A9"/>
+                </a:solidFill>
+              </a:rPr>
+              <a:t>]</a:t>
             </a:r>
             <a:r>
               <a:rPr lang="en-US" sz="2400" b="1" dirty="0" smtClean="0"/>
@@ -6290,9 +6368,63 @@
               <a:rPr lang="en-US" sz="2400" dirty="0">
                 <a:hlinkClick r:id="rId4"/>
               </a:rPr>
-              <a:t>Patrick Sweeney, "Images of Faces Gleaned from Social Media in Social Psychological Research on Sexual Orientation," 2017</a:t>
-            </a:r>
-            <a:endParaRPr lang="en-US" sz="2000" dirty="0"/>
+              <a:t>Patrick Sweeney, "Images of Faces Gleaned from Social Media in Social Psychological Research on Sexual Orientation," </a:t>
+            </a:r>
+            <a:r>
+              <a:rPr lang="en-US" sz="2400" dirty="0" smtClean="0">
+                <a:hlinkClick r:id="rId4"/>
+              </a:rPr>
+              <a:t>2017</a:t>
+            </a:r>
+            <a:r>
+              <a:rPr lang="en-US" sz="2400" dirty="0" smtClean="0"/>
+              <a:t> </a:t>
+            </a:r>
+            <a:r>
+              <a:rPr lang="en-US" sz="2400" dirty="0" smtClean="0">
+                <a:solidFill>
+                  <a:srgbClr val="FFF8A9"/>
+                </a:solidFill>
+              </a:rPr>
+              <a:t>[</a:t>
+            </a:r>
+            <a:r>
+              <a:rPr lang="en-US" sz="2400" dirty="0" err="1" smtClean="0">
+                <a:solidFill>
+                  <a:srgbClr val="FFF8A9"/>
+                </a:solidFill>
+              </a:rPr>
+              <a:t>tinyurl.com</a:t>
+            </a:r>
+            <a:r>
+              <a:rPr lang="en-US" sz="2400" dirty="0" smtClean="0">
+                <a:solidFill>
+                  <a:srgbClr val="FFF8A9"/>
+                </a:solidFill>
+              </a:rPr>
+              <a:t>/</a:t>
+            </a:r>
+            <a:r>
+              <a:rPr lang="en-US" sz="2400" dirty="0" err="1" smtClean="0">
+                <a:solidFill>
+                  <a:srgbClr val="FFF8A9"/>
+                </a:solidFill>
+              </a:rPr>
+              <a:t>sweeneyimages</a:t>
+            </a:r>
+            <a:r>
+              <a:rPr lang="en-US" sz="2400" dirty="0" smtClean="0">
+                <a:solidFill>
+                  <a:srgbClr val="FFF8A9"/>
+                </a:solidFill>
+              </a:rPr>
+              <a:t>]</a:t>
+            </a:r>
+            <a:endParaRPr lang="en-US" sz="2000" dirty="0">
+              <a:solidFill>
+                <a:srgbClr val="FFF8A9"/>
+              </a:solidFill>
+            </a:endParaRPr>
           </a:p>
         </p:txBody>
       </p:sp>
@@ -7708,8 +7840,8 @@
         </p:nvSpPr>
         <p:spPr>
           <a:xfrm>
-            <a:off x="831850" y="1838075"/>
-            <a:ext cx="10515600" cy="2852737"/>
+            <a:off x="574675" y="1825375"/>
+            <a:ext cx="11029950" cy="2852737"/>
           </a:xfrm>
         </p:spPr>
         <p:txBody>
@@ -7763,14 +7895,46 @@
               <a:t>out the </a:t>
             </a:r>
             <a:r>
-              <a:rPr lang="en-US" sz="3200" dirty="0">
+              <a:rPr lang="en-US" sz="3200" dirty="0" smtClean="0">
                 <a:hlinkClick r:id="rId2"/>
               </a:rPr>
               <a:t>Interference Archive (IA) website</a:t>
             </a:r>
             <a:r>
+              <a:rPr lang="en-US" sz="3200" dirty="0" smtClean="0"/>
+              <a:t> </a:t>
+            </a:r>
+            <a:r>
+              <a:rPr lang="en-US" sz="3200" dirty="0" smtClean="0">
+                <a:solidFill>
+                  <a:srgbClr val="FFF8A9"/>
+                </a:solidFill>
+              </a:rPr>
+              <a:t>[</a:t>
+            </a:r>
+            <a:r>
+              <a:rPr lang="en-US" sz="3200" dirty="0" err="1" smtClean="0">
+                <a:solidFill>
+                  <a:srgbClr val="FFF8A9"/>
+                </a:solidFill>
+              </a:rPr>
+              <a:t>interferencearchive.org</a:t>
+            </a:r>
+            <a:r>
+              <a:rPr lang="en-US" sz="3200" dirty="0" smtClean="0">
+                <a:solidFill>
+                  <a:srgbClr val="FFF8A9"/>
+                </a:solidFill>
+              </a:rPr>
+              <a:t>]</a:t>
+            </a:r>
+            <a:r>
+              <a:rPr lang="en-US" sz="3200" dirty="0" smtClean="0"/>
+              <a:t>, </a:t>
+            </a:r>
+            <a:r>
               <a:rPr lang="en-US" sz="3200" dirty="0"/>
-              <a:t>, read </a:t>
+              <a:t>read </a:t>
             </a:r>
             <a:r>
               <a:rPr lang="en-US" sz="3200" dirty="0">
@@ -7780,7 +7944,55 @@
             </a:r>
             <a:r>
               <a:rPr lang="en-US" sz="3200" dirty="0"/>
-              <a:t> and discuss</a:t>
+              <a:t> </a:t>
+            </a:r>
+            <a:r>
+              <a:rPr lang="en-US" sz="3200" dirty="0" smtClean="0">
+                <a:solidFill>
+                  <a:srgbClr val="FFF8A9"/>
+                </a:solidFill>
+              </a:rPr>
+              <a:t>[</a:t>
+            </a:r>
+            <a:r>
+              <a:rPr lang="en-US" sz="3200" dirty="0" err="1" smtClean="0">
+                <a:solidFill>
+                  <a:srgbClr val="FFF8A9"/>
+                </a:solidFill>
+              </a:rPr>
+              <a:t>tinyurl.com</a:t>
+            </a:r>
+            <a:r>
+              <a:rPr lang="en-US" sz="3200" dirty="0" smtClean="0">
+                <a:solidFill>
+                  <a:srgbClr val="FFF8A9"/>
+                </a:solidFill>
+              </a:rPr>
+              <a:t>/</a:t>
+            </a:r>
+            <a:r>
+              <a:rPr lang="en-US" sz="3200" dirty="0" err="1" smtClean="0">
+                <a:solidFill>
+                  <a:srgbClr val="FFF8A9"/>
+                </a:solidFill>
+              </a:rPr>
+              <a:t>joynerhidden</a:t>
+            </a:r>
+            <a:r>
+              <a:rPr lang="en-US" sz="3200" dirty="0" smtClean="0">
+                <a:solidFill>
+                  <a:srgbClr val="FFF8A9"/>
+                </a:solidFill>
+              </a:rPr>
+              <a:t>]</a:t>
+            </a:r>
+            <a:r>
+              <a:rPr lang="en-US" sz="3200" dirty="0" smtClean="0"/>
+              <a:t> and </a:t>
+            </a:r>
+            <a:r>
+              <a:rPr lang="en-US" sz="3200" dirty="0"/>
+              <a:t>discuss</a:t>
             </a:r>
             <a:r>
               <a:rPr lang="en-US" sz="3200" dirty="0" smtClean="0"/>
@@ -7798,11 +8010,7 @@
             </a:br>
             <a:r>
               <a:rPr lang="en-US" sz="3200" dirty="0" smtClean="0"/>
-              <a:t>&gt;&gt;</a:t>
-            </a:r>
-            <a:r>
-              <a:rPr lang="en-US" sz="3200" dirty="0" smtClean="0"/>
-              <a:t> What </a:t>
+              <a:t>&gt;&gt; What </a:t>
             </a:r>
             <a:r>
               <a:rPr lang="en-US" sz="3200" dirty="0"/>
@@ -7824,15 +8032,7 @@
             </a:br>
             <a:r>
               <a:rPr lang="en-US" sz="3200" dirty="0" smtClean="0"/>
-              <a:t>&gt;</a:t>
-            </a:r>
-            <a:r>
-              <a:rPr lang="en-US" sz="3200" dirty="0" smtClean="0"/>
-              <a:t>&gt;</a:t>
-            </a:r>
-            <a:r>
-              <a:rPr lang="en-US" sz="3200" dirty="0" smtClean="0"/>
-              <a:t>  In </a:t>
+              <a:t>&gt;&gt;  In </a:t>
             </a:r>
             <a:r>
               <a:rPr lang="en-US" sz="3200" dirty="0"/>
@@ -7854,11 +8054,7 @@
             </a:br>
             <a:r>
               <a:rPr lang="en-US" sz="3200" dirty="0" smtClean="0"/>
-              <a:t>&gt;&gt;</a:t>
-            </a:r>
-            <a:r>
-              <a:rPr lang="en-US" sz="3200" dirty="0" smtClean="0"/>
-              <a:t>  What </a:t>
+              <a:t>&gt;&gt;  What </a:t>
             </a:r>
             <a:r>
               <a:rPr lang="en-US" sz="3200" dirty="0"/>
@@ -7917,15 +8113,15 @@
                   <a:schemeClr val="tx2"/>
                 </a:solidFill>
               </a:rPr>
-              <a:t>[See</a:t>
-            </a:r>
-            <a:r>
-              <a:rPr lang="en-US" smtClean="0">
+              <a:t>[See: </a:t>
+            </a:r>
+            <a:r>
+              <a:rPr lang="en-US" dirty="0" smtClean="0">
                 <a:solidFill>
                   <a:schemeClr val="tx2"/>
                 </a:solidFill>
               </a:rPr>
-              <a:t>: impact1cont.md</a:t>
+              <a:t>impact2cont.md</a:t>
             </a:r>
             <a:r>
               <a:rPr lang="en-US" dirty="0" smtClean="0">
@@ -8277,11 +8473,7 @@
             <a:pPr algn="ctr"/>
             <a:r>
               <a:rPr lang="en-US" sz="6000" dirty="0" smtClean="0"/>
-              <a:t>How m</a:t>
-            </a:r>
-            <a:r>
-              <a:rPr lang="en-US" sz="6000" dirty="0" smtClean="0"/>
-              <a:t>ay digital projects or </a:t>
+              <a:t>How may digital projects or </a:t>
             </a:r>
             <a:r>
               <a:rPr lang="en-US" sz="6000" dirty="0"/>
@@ -8913,15 +9105,7 @@
                   <a:schemeClr val="tx2"/>
                 </a:solidFill>
               </a:rPr>
-              <a:t>: </a:t>
-            </a:r>
-            <a:r>
-              <a:rPr lang="en-US" smtClean="0">
-                <a:solidFill>
-                  <a:schemeClr val="tx2"/>
-                </a:solidFill>
-              </a:rPr>
-              <a:t>impact3.md</a:t>
+              <a:t>: impact3.md</a:t>
             </a:r>
             <a:r>
               <a:rPr lang="en-US" dirty="0" smtClean="0">
@@ -10489,19 +10673,7 @@
           <a:p>
             <a:r>
               <a:rPr lang="en-US" dirty="0" smtClean="0"/>
-              <a:t>for</a:t>
-            </a:r>
-            <a:r>
-              <a:rPr lang="en-US" dirty="0" smtClean="0"/>
-              <a:t> example: how were computers developed? </a:t>
-            </a:r>
-            <a:r>
-              <a:rPr lang="en-US" dirty="0" smtClean="0"/>
-              <a:t>By whom? Where? Why</a:t>
-            </a:r>
-            <a:r>
-              <a:rPr lang="en-US" dirty="0" smtClean="0"/>
-              <a:t>? </a:t>
+              <a:t>for example: how were computers developed? By whom? Where? Why? </a:t>
             </a:r>
             <a:br>
               <a:rPr lang="en-US" dirty="0" smtClean="0"/>
@@ -11074,7 +11246,6 @@
               <a:rPr lang="en-US" sz="2800" dirty="0"/>
               <a:t>your research methodology</a:t>
             </a:r>
-            <a:endParaRPr lang="en-US" sz="2800" dirty="0"/>
           </a:p>
         </p:txBody>
       </p:sp>
@@ -11212,15 +11383,7 @@
                   <a:schemeClr val="accent1"/>
                 </a:solidFill>
               </a:rPr>
-              <a:t>Session leader and content created by: Kelsey </a:t>
-            </a:r>
-            <a:r>
-              <a:rPr lang="en-US" dirty="0" smtClean="0">
-                <a:solidFill>
-                  <a:schemeClr val="accent1"/>
-                </a:solidFill>
-              </a:rPr>
-              <a:t>Chatlosh @</a:t>
+              <a:t>Session leader and content created by: Kelsey Chatlosh @</a:t>
             </a:r>
             <a:r>
               <a:rPr lang="en-US" dirty="0" err="1" smtClean="0">
@@ -11243,7 +11406,15 @@
                   <a:schemeClr val="accent1"/>
                 </a:solidFill>
               </a:rPr>
-              <a:t>Edited by: Patrick Sweeney </a:t>
+              <a:t>Edited by: Patrick Sweeney @</a:t>
+            </a:r>
+            <a:r>
+              <a:rPr lang="en-US" dirty="0" err="1" smtClean="0">
+                <a:solidFill>
+                  <a:schemeClr val="accent1"/>
+                </a:solidFill>
+              </a:rPr>
+              <a:t>pswee</a:t>
             </a:r>
             <a:r>
               <a:rPr lang="en-US" dirty="0" smtClean="0">
@@ -11251,45 +11422,8 @@
                   <a:schemeClr val="accent1"/>
                 </a:solidFill>
               </a:rPr>
-              <a:t>@</a:t>
-            </a:r>
-            <a:r>
-              <a:rPr lang="en-US" dirty="0" err="1" smtClean="0">
-                <a:solidFill>
-                  <a:schemeClr val="accent1"/>
-                </a:solidFill>
-              </a:rPr>
-              <a:t>pswee</a:t>
-            </a:r>
-            <a:r>
-              <a:rPr lang="en-US" dirty="0" smtClean="0">
-                <a:solidFill>
-                  <a:schemeClr val="accent1"/>
-                </a:solidFill>
-              </a:rPr>
-              <a:t> and </a:t>
-            </a:r>
-            <a:r>
-              <a:rPr lang="en-US" dirty="0" smtClean="0">
-                <a:solidFill>
-                  <a:schemeClr val="accent1"/>
-                </a:solidFill>
-              </a:rPr>
-              <a:t>Patrick </a:t>
-            </a:r>
-            <a:r>
-              <a:rPr lang="en-US" dirty="0" smtClean="0">
-                <a:solidFill>
-                  <a:schemeClr val="accent1"/>
-                </a:solidFill>
-              </a:rPr>
-              <a:t>Smyth @psmyth01</a:t>
-            </a:r>
-            <a:endParaRPr lang="en-US" dirty="0" smtClean="0">
-              <a:solidFill>
-                <a:schemeClr val="accent1"/>
-              </a:solidFill>
-            </a:endParaRPr>
+              <a:t> and Patrick Smyth @psmyth01</a:t>
+            </a:r>
           </a:p>
           <a:p>
             <a:r>
@@ -11898,11 +12032,7 @@
           <a:p>
             <a:r>
               <a:rPr lang="en-US" dirty="0" smtClean="0"/>
-              <a:t>3 core </a:t>
-            </a:r>
-            <a:r>
-              <a:rPr lang="en-US" dirty="0" smtClean="0"/>
-              <a:t>principles</a:t>
+              <a:t>3 core principles</a:t>
             </a:r>
             <a:endParaRPr lang="en-US" dirty="0"/>
           </a:p>
@@ -12014,13 +12144,8 @@
             </a:pPr>
             <a:r>
               <a:rPr lang="en-US" dirty="0" smtClean="0"/>
-              <a:t>Informed </a:t>
-            </a:r>
-            <a:r>
-              <a:rPr lang="en-US" dirty="0" smtClean="0"/>
-              <a:t>consent</a:t>
-            </a:r>
-            <a:endParaRPr lang="en-US" dirty="0" smtClean="0"/>
+              <a:t>Informed consent</a:t>
+            </a:r>
           </a:p>
           <a:p>
             <a:pPr marL="514350" indent="-514350">

</xml_diff>

<commit_message>
changed .md references and other fonts' size and color for better visibility in slides
</commit_message>
<xml_diff>
--- a/slides.pptx
+++ b/slides.pptx
@@ -248,7 +248,7 @@
           <a:p>
             <a:fld id="{06B4544B-6879-EF48-AA6C-F3023B74A8AE}" type="datetimeFigureOut">
               <a:rPr lang="en-US" smtClean="0"/>
-              <a:t>6/13/18</a:t>
+              <a:t>6/14/18</a:t>
             </a:fld>
             <a:endParaRPr lang="en-US"/>
           </a:p>
@@ -731,7 +731,7 @@
           <a:p>
             <a:fld id="{9AC27B76-91ED-7A4A-8EA0-BB567F84DA22}" type="datetimeFigureOut">
               <a:rPr lang="en-US" smtClean="0"/>
-              <a:t>6/13/18</a:t>
+              <a:t>6/14/18</a:t>
             </a:fld>
             <a:endParaRPr lang="en-US"/>
           </a:p>
@@ -896,7 +896,7 @@
           <a:p>
             <a:fld id="{9AC27B76-91ED-7A4A-8EA0-BB567F84DA22}" type="datetimeFigureOut">
               <a:rPr lang="en-US" smtClean="0"/>
-              <a:t>6/13/18</a:t>
+              <a:t>6/14/18</a:t>
             </a:fld>
             <a:endParaRPr lang="en-US"/>
           </a:p>
@@ -1071,7 +1071,7 @@
           <a:p>
             <a:fld id="{9AC27B76-91ED-7A4A-8EA0-BB567F84DA22}" type="datetimeFigureOut">
               <a:rPr lang="en-US" smtClean="0"/>
-              <a:t>6/13/18</a:t>
+              <a:t>6/14/18</a:t>
             </a:fld>
             <a:endParaRPr lang="en-US"/>
           </a:p>
@@ -1236,7 +1236,7 @@
           <a:p>
             <a:fld id="{9AC27B76-91ED-7A4A-8EA0-BB567F84DA22}" type="datetimeFigureOut">
               <a:rPr lang="en-US" smtClean="0"/>
-              <a:t>6/13/18</a:t>
+              <a:t>6/14/18</a:t>
             </a:fld>
             <a:endParaRPr lang="en-US"/>
           </a:p>
@@ -1477,7 +1477,7 @@
           <a:p>
             <a:fld id="{9AC27B76-91ED-7A4A-8EA0-BB567F84DA22}" type="datetimeFigureOut">
               <a:rPr lang="en-US" smtClean="0"/>
-              <a:t>6/13/18</a:t>
+              <a:t>6/14/18</a:t>
             </a:fld>
             <a:endParaRPr lang="en-US"/>
           </a:p>
@@ -1704,7 +1704,7 @@
           <a:p>
             <a:fld id="{9AC27B76-91ED-7A4A-8EA0-BB567F84DA22}" type="datetimeFigureOut">
               <a:rPr lang="en-US" smtClean="0"/>
-              <a:t>6/13/18</a:t>
+              <a:t>6/14/18</a:t>
             </a:fld>
             <a:endParaRPr lang="en-US"/>
           </a:p>
@@ -2066,7 +2066,7 @@
           <a:p>
             <a:fld id="{9AC27B76-91ED-7A4A-8EA0-BB567F84DA22}" type="datetimeFigureOut">
               <a:rPr lang="en-US" smtClean="0"/>
-              <a:t>6/13/18</a:t>
+              <a:t>6/14/18</a:t>
             </a:fld>
             <a:endParaRPr lang="en-US"/>
           </a:p>
@@ -2179,7 +2179,7 @@
           <a:p>
             <a:fld id="{9AC27B76-91ED-7A4A-8EA0-BB567F84DA22}" type="datetimeFigureOut">
               <a:rPr lang="en-US" smtClean="0"/>
-              <a:t>6/13/18</a:t>
+              <a:t>6/14/18</a:t>
             </a:fld>
             <a:endParaRPr lang="en-US"/>
           </a:p>
@@ -2269,7 +2269,7 @@
           <a:p>
             <a:fld id="{9AC27B76-91ED-7A4A-8EA0-BB567F84DA22}" type="datetimeFigureOut">
               <a:rPr lang="en-US" smtClean="0"/>
-              <a:t>6/13/18</a:t>
+              <a:t>6/14/18</a:t>
             </a:fld>
             <a:endParaRPr lang="en-US"/>
           </a:p>
@@ -2541,7 +2541,7 @@
           <a:p>
             <a:fld id="{9AC27B76-91ED-7A4A-8EA0-BB567F84DA22}" type="datetimeFigureOut">
               <a:rPr lang="en-US" smtClean="0"/>
-              <a:t>6/13/18</a:t>
+              <a:t>6/14/18</a:t>
             </a:fld>
             <a:endParaRPr lang="en-US"/>
           </a:p>
@@ -2793,7 +2793,7 @@
           <a:p>
             <a:fld id="{9AC27B76-91ED-7A4A-8EA0-BB567F84DA22}" type="datetimeFigureOut">
               <a:rPr lang="en-US" smtClean="0"/>
-              <a:t>6/13/18</a:t>
+              <a:t>6/14/18</a:t>
             </a:fld>
             <a:endParaRPr lang="en-US"/>
           </a:p>
@@ -3001,7 +3001,7 @@
           <a:p>
             <a:fld id="{9AC27B76-91ED-7A4A-8EA0-BB567F84DA22}" type="datetimeFigureOut">
               <a:rPr lang="en-US" smtClean="0"/>
-              <a:t>6/13/18</a:t>
+              <a:t>6/14/18</a:t>
             </a:fld>
             <a:endParaRPr lang="en-US"/>
           </a:p>
@@ -3452,67 +3452,35 @@
           <a:lstStyle/>
           <a:p>
             <a:r>
-              <a:rPr lang="en-US" dirty="0" smtClean="0">
-                <a:solidFill>
-                  <a:schemeClr val="accent1"/>
-                </a:solidFill>
-              </a:rPr>
+              <a:rPr lang="en-US" dirty="0" smtClean="0"/>
               <a:t>Session leader and content created by: Kelsey Chatlosh @</a:t>
             </a:r>
             <a:r>
-              <a:rPr lang="en-US" dirty="0" err="1" smtClean="0">
-                <a:solidFill>
-                  <a:schemeClr val="accent1"/>
-                </a:solidFill>
-              </a:rPr>
+              <a:rPr lang="en-US" dirty="0" err="1" smtClean="0"/>
               <a:t>kchatlosh</a:t>
             </a:r>
-            <a:endParaRPr lang="en-US" dirty="0" smtClean="0">
-              <a:solidFill>
-                <a:schemeClr val="accent1"/>
-              </a:solidFill>
-            </a:endParaRPr>
-          </a:p>
-          <a:p>
-            <a:r>
-              <a:rPr lang="en-US" dirty="0" smtClean="0">
-                <a:solidFill>
-                  <a:schemeClr val="accent1"/>
-                </a:solidFill>
-              </a:rPr>
+            <a:endParaRPr lang="en-US" dirty="0" smtClean="0"/>
+          </a:p>
+          <a:p>
+            <a:r>
+              <a:rPr lang="en-US" dirty="0" smtClean="0"/>
               <a:t>Edited by: Patrick Sweeney @</a:t>
             </a:r>
             <a:r>
-              <a:rPr lang="en-US" dirty="0" err="1" smtClean="0">
-                <a:solidFill>
-                  <a:schemeClr val="accent1"/>
-                </a:solidFill>
-              </a:rPr>
+              <a:rPr lang="en-US" dirty="0" err="1" smtClean="0"/>
               <a:t>pswee</a:t>
             </a:r>
             <a:r>
-              <a:rPr lang="en-US" dirty="0" smtClean="0">
-                <a:solidFill>
-                  <a:schemeClr val="accent1"/>
-                </a:solidFill>
-              </a:rPr>
+              <a:rPr lang="en-US" dirty="0" smtClean="0"/>
               <a:t> and Patrick Smyth @psmyth01</a:t>
             </a:r>
           </a:p>
           <a:p>
             <a:r>
-              <a:rPr lang="en-US" dirty="0" smtClean="0">
-                <a:solidFill>
-                  <a:schemeClr val="accent1"/>
-                </a:solidFill>
-              </a:rPr>
+              <a:rPr lang="en-US" dirty="0" smtClean="0"/>
               <a:t>dhinstitutes.org #DHRI</a:t>
             </a:r>
-            <a:endParaRPr lang="en-US" dirty="0">
-              <a:solidFill>
-                <a:schemeClr val="accent1"/>
-              </a:solidFill>
-            </a:endParaRPr>
+            <a:endParaRPr lang="en-US" dirty="0"/>
           </a:p>
         </p:txBody>
       </p:sp>
@@ -3548,8 +3516,8 @@
         </p:nvSpPr>
         <p:spPr>
           <a:xfrm>
-            <a:off x="5098323" y="6356502"/>
-            <a:ext cx="1995354" cy="369332"/>
+            <a:off x="4594018" y="6334780"/>
+            <a:ext cx="3003964" cy="523220"/>
           </a:xfrm>
           <a:prstGeom prst="rect">
             <a:avLst/>
@@ -3563,18 +3531,10 @@
           <a:p>
             <a:pPr algn="ctr"/>
             <a:r>
-              <a:rPr lang="en-US" dirty="0" smtClean="0">
-                <a:solidFill>
-                  <a:schemeClr val="accent5"/>
-                </a:solidFill>
-              </a:rPr>
+              <a:rPr lang="en-US" sz="2800" dirty="0" smtClean="0"/>
               <a:t>[See: README.MD]</a:t>
             </a:r>
-            <a:endParaRPr lang="en-US" dirty="0">
-              <a:solidFill>
-                <a:schemeClr val="accent5"/>
-              </a:solidFill>
-            </a:endParaRPr>
+            <a:endParaRPr lang="en-US" sz="2800" dirty="0"/>
           </a:p>
         </p:txBody>
       </p:sp>
@@ -3718,8 +3678,8 @@
         </p:nvSpPr>
         <p:spPr>
           <a:xfrm>
-            <a:off x="5128651" y="6312205"/>
-            <a:ext cx="1934697" cy="369332"/>
+            <a:off x="4644318" y="6334780"/>
+            <a:ext cx="2903359" cy="523220"/>
           </a:xfrm>
           <a:prstGeom prst="rect">
             <a:avLst/>
@@ -3732,34 +3692,18 @@
           <a:lstStyle/>
           <a:p>
             <a:r>
-              <a:rPr lang="en-US" dirty="0" smtClean="0">
-                <a:solidFill>
-                  <a:schemeClr val="accent5"/>
-                </a:solidFill>
-              </a:rPr>
+              <a:rPr lang="en-US" sz="2800" dirty="0" smtClean="0"/>
               <a:t>[See: </a:t>
             </a:r>
             <a:r>
-              <a:rPr lang="en-US" dirty="0" err="1" smtClean="0">
-                <a:solidFill>
-                  <a:schemeClr val="accent5"/>
-                </a:solidFill>
-              </a:rPr>
+              <a:rPr lang="en-US" sz="2800" dirty="0" err="1" smtClean="0"/>
               <a:t>belmont.md</a:t>
             </a:r>
             <a:r>
-              <a:rPr lang="en-US" dirty="0" smtClean="0">
-                <a:solidFill>
-                  <a:schemeClr val="accent5"/>
-                </a:solidFill>
-              </a:rPr>
+              <a:rPr lang="en-US" sz="2800" dirty="0" smtClean="0"/>
               <a:t>]</a:t>
             </a:r>
-            <a:endParaRPr lang="en-US" dirty="0">
-              <a:solidFill>
-                <a:schemeClr val="accent5"/>
-              </a:solidFill>
-            </a:endParaRPr>
+            <a:endParaRPr lang="en-US" sz="2800" dirty="0"/>
           </a:p>
         </p:txBody>
       </p:sp>
@@ -3773,6 +3717,13 @@
   <p:clrMapOvr>
     <a:masterClrMapping/>
   </p:clrMapOvr>
+  <p:timing>
+    <p:tnLst>
+      <p:par>
+        <p:cTn id="1" dur="indefinite" restart="never" nodeType="tmRoot"/>
+      </p:par>
+    </p:tnLst>
+  </p:timing>
 </p:sld>
 </file>
 
@@ -3839,8 +3790,8 @@
         </p:nvSpPr>
         <p:spPr>
           <a:xfrm>
-            <a:off x="5397732" y="6360331"/>
-            <a:ext cx="1396536" cy="369332"/>
+            <a:off x="5061902" y="6334780"/>
+            <a:ext cx="2068195" cy="523220"/>
           </a:xfrm>
           <a:prstGeom prst="rect">
             <a:avLst/>
@@ -3853,34 +3804,18 @@
           <a:lstStyle/>
           <a:p>
             <a:r>
-              <a:rPr lang="en-US" dirty="0" smtClean="0">
-                <a:solidFill>
-                  <a:schemeClr val="accent5"/>
-                </a:solidFill>
-              </a:rPr>
+              <a:rPr lang="en-US" sz="2800" dirty="0" smtClean="0"/>
               <a:t>[See: </a:t>
             </a:r>
             <a:r>
-              <a:rPr lang="en-US" dirty="0" err="1" smtClean="0">
-                <a:solidFill>
-                  <a:schemeClr val="accent5"/>
-                </a:solidFill>
-              </a:rPr>
+              <a:rPr lang="en-US" sz="2800" dirty="0" err="1" smtClean="0"/>
               <a:t>irb.md</a:t>
             </a:r>
             <a:r>
-              <a:rPr lang="en-US" dirty="0" smtClean="0">
-                <a:solidFill>
-                  <a:schemeClr val="accent5"/>
-                </a:solidFill>
-              </a:rPr>
+              <a:rPr lang="en-US" sz="2800" dirty="0" smtClean="0"/>
               <a:t>]</a:t>
             </a:r>
-            <a:endParaRPr lang="en-US" dirty="0">
-              <a:solidFill>
-                <a:schemeClr val="accent5"/>
-              </a:solidFill>
-            </a:endParaRPr>
+            <a:endParaRPr lang="en-US" sz="2800" dirty="0"/>
           </a:p>
         </p:txBody>
       </p:sp>
@@ -3894,6 +3829,13 @@
   <p:clrMapOvr>
     <a:masterClrMapping/>
   </p:clrMapOvr>
+  <p:timing>
+    <p:tnLst>
+      <p:par>
+        <p:cTn id="1" dur="indefinite" restart="never" nodeType="tmRoot"/>
+      </p:par>
+    </p:tnLst>
+  </p:timing>
 </p:sld>
 </file>
 
@@ -3988,8 +3930,8 @@
         </p:nvSpPr>
         <p:spPr>
           <a:xfrm>
-            <a:off x="5397732" y="6360331"/>
-            <a:ext cx="1396536" cy="369332"/>
+            <a:off x="5045860" y="6334780"/>
+            <a:ext cx="2068195" cy="523220"/>
           </a:xfrm>
           <a:prstGeom prst="rect">
             <a:avLst/>
@@ -4002,34 +3944,18 @@
           <a:lstStyle/>
           <a:p>
             <a:r>
-              <a:rPr lang="en-US" dirty="0" smtClean="0">
-                <a:solidFill>
-                  <a:schemeClr val="accent5"/>
-                </a:solidFill>
-              </a:rPr>
+              <a:rPr lang="en-US" sz="2800" dirty="0" smtClean="0"/>
               <a:t>[See: </a:t>
             </a:r>
             <a:r>
-              <a:rPr lang="en-US" dirty="0" err="1" smtClean="0">
-                <a:solidFill>
-                  <a:schemeClr val="accent5"/>
-                </a:solidFill>
-              </a:rPr>
+              <a:rPr lang="en-US" sz="2800" dirty="0" err="1" smtClean="0"/>
               <a:t>irb.md</a:t>
             </a:r>
             <a:r>
-              <a:rPr lang="en-US" dirty="0" smtClean="0">
-                <a:solidFill>
-                  <a:schemeClr val="accent5"/>
-                </a:solidFill>
-              </a:rPr>
+              <a:rPr lang="en-US" sz="2800" dirty="0" smtClean="0"/>
               <a:t>]</a:t>
             </a:r>
-            <a:endParaRPr lang="en-US" dirty="0">
-              <a:solidFill>
-                <a:schemeClr val="accent5"/>
-              </a:solidFill>
-            </a:endParaRPr>
+            <a:endParaRPr lang="en-US" sz="2800" dirty="0"/>
           </a:p>
         </p:txBody>
       </p:sp>
@@ -4043,6 +3969,13 @@
   <p:clrMapOvr>
     <a:masterClrMapping/>
   </p:clrMapOvr>
+  <p:timing>
+    <p:tnLst>
+      <p:par>
+        <p:cTn id="1" dur="indefinite" restart="never" nodeType="tmRoot"/>
+      </p:par>
+    </p:tnLst>
+  </p:timing>
 </p:sld>
 </file>
 
@@ -4267,8 +4200,8 @@
         </p:nvSpPr>
         <p:spPr>
           <a:xfrm>
-            <a:off x="5167346" y="6376373"/>
-            <a:ext cx="1844608" cy="369332"/>
+            <a:off x="4708374" y="6334780"/>
+            <a:ext cx="2762551" cy="523220"/>
           </a:xfrm>
           <a:prstGeom prst="rect">
             <a:avLst/>
@@ -4281,7 +4214,7 @@
           <a:lstStyle/>
           <a:p>
             <a:r>
-              <a:rPr lang="en-US" dirty="0" smtClean="0">
+              <a:rPr lang="en-US" sz="2800" dirty="0" smtClean="0">
                 <a:solidFill>
                   <a:schemeClr val="tx2"/>
                 </a:solidFill>
@@ -4289,7 +4222,7 @@
               <a:t>[See: </a:t>
             </a:r>
             <a:r>
-              <a:rPr lang="en-US" dirty="0" err="1" smtClean="0">
+              <a:rPr lang="en-US" sz="2800" dirty="0" err="1" smtClean="0">
                 <a:solidFill>
                   <a:schemeClr val="tx2"/>
                 </a:solidFill>
@@ -4297,14 +4230,14 @@
               <a:t>beyond.md</a:t>
             </a:r>
             <a:r>
-              <a:rPr lang="en-US" dirty="0" smtClean="0">
+              <a:rPr lang="en-US" sz="2800" dirty="0" smtClean="0">
                 <a:solidFill>
                   <a:schemeClr val="tx2"/>
                 </a:solidFill>
               </a:rPr>
               <a:t>]</a:t>
             </a:r>
-            <a:endParaRPr lang="en-US" dirty="0">
+            <a:endParaRPr lang="en-US" sz="2800" dirty="0">
               <a:solidFill>
                 <a:schemeClr val="tx2"/>
               </a:solidFill>
@@ -4322,6 +4255,13 @@
   <p:clrMapOvr>
     <a:masterClrMapping/>
   </p:clrMapOvr>
+  <p:timing>
+    <p:tnLst>
+      <p:par>
+        <p:cTn id="1" dur="indefinite" restart="never" nodeType="tmRoot"/>
+      </p:par>
+    </p:tnLst>
+  </p:timing>
 </p:sld>
 </file>
 
@@ -4412,11 +4352,7 @@
             </a:br>
             <a:r>
               <a:rPr lang="en-US" sz="4800" dirty="0" smtClean="0"/>
-              <a:t>(Markham </a:t>
-            </a:r>
-            <a:r>
-              <a:rPr lang="en-US" sz="4800" dirty="0" smtClean="0"/>
-              <a:t>2016 </a:t>
+              <a:t>(Markham 2016 </a:t>
             </a:r>
             <a:r>
               <a:rPr lang="en-US" sz="4800" dirty="0" smtClean="0">
@@ -4507,8 +4443,8 @@
         </p:nvSpPr>
         <p:spPr>
           <a:xfrm>
-            <a:off x="5257800" y="6354110"/>
-            <a:ext cx="2313710" cy="369332"/>
+            <a:off x="4122240" y="6298297"/>
+            <a:ext cx="3491853" cy="523220"/>
           </a:xfrm>
           <a:prstGeom prst="rect">
             <a:avLst/>
@@ -4521,34 +4457,18 @@
           <a:lstStyle/>
           <a:p>
             <a:r>
-              <a:rPr lang="en-US" dirty="0" smtClean="0">
-                <a:solidFill>
-                  <a:schemeClr val="tx2"/>
-                </a:solidFill>
-              </a:rPr>
+              <a:rPr lang="en-US" sz="2800" dirty="0" smtClean="0"/>
               <a:t>[See: </a:t>
             </a:r>
             <a:r>
-              <a:rPr lang="en-US" dirty="0" err="1" smtClean="0">
-                <a:solidFill>
-                  <a:schemeClr val="tx2"/>
-                </a:solidFill>
-              </a:rPr>
+              <a:rPr lang="en-US" sz="2800" dirty="0" err="1" smtClean="0"/>
               <a:t>levelsimpact.md</a:t>
             </a:r>
             <a:r>
-              <a:rPr lang="en-US" dirty="0" smtClean="0">
-                <a:solidFill>
-                  <a:schemeClr val="tx2"/>
-                </a:solidFill>
-              </a:rPr>
+              <a:rPr lang="en-US" sz="2800" dirty="0" smtClean="0"/>
               <a:t>]</a:t>
             </a:r>
-            <a:endParaRPr lang="en-US" dirty="0">
-              <a:solidFill>
-                <a:schemeClr val="tx2"/>
-              </a:solidFill>
-            </a:endParaRPr>
+            <a:endParaRPr lang="en-US" sz="2800" dirty="0"/>
           </a:p>
         </p:txBody>
       </p:sp>
@@ -4562,6 +4482,13 @@
   <p:clrMapOvr>
     <a:masterClrMapping/>
   </p:clrMapOvr>
+  <p:timing>
+    <p:tnLst>
+      <p:par>
+        <p:cTn id="1" dur="indefinite" restart="never" nodeType="tmRoot"/>
+      </p:par>
+    </p:tnLst>
+  </p:timing>
 </p:sld>
 </file>
 
@@ -4660,8 +4587,8 @@
         </p:nvSpPr>
         <p:spPr>
           <a:xfrm>
-            <a:off x="4907061" y="6354110"/>
-            <a:ext cx="2313710" cy="369332"/>
+            <a:off x="4317989" y="6334780"/>
+            <a:ext cx="3491853" cy="523220"/>
           </a:xfrm>
           <a:prstGeom prst="rect">
             <a:avLst/>
@@ -4674,34 +4601,18 @@
           <a:lstStyle/>
           <a:p>
             <a:r>
-              <a:rPr lang="en-US" dirty="0" smtClean="0">
-                <a:solidFill>
-                  <a:schemeClr val="accent5"/>
-                </a:solidFill>
-              </a:rPr>
+              <a:rPr lang="en-US" sz="2800" dirty="0" smtClean="0"/>
               <a:t>[See: </a:t>
             </a:r>
             <a:r>
-              <a:rPr lang="en-US" dirty="0" err="1" smtClean="0">
-                <a:solidFill>
-                  <a:schemeClr val="accent5"/>
-                </a:solidFill>
-              </a:rPr>
+              <a:rPr lang="en-US" sz="2800" dirty="0" err="1" smtClean="0"/>
               <a:t>levelsimpact.md</a:t>
             </a:r>
             <a:r>
-              <a:rPr lang="en-US" dirty="0" smtClean="0">
-                <a:solidFill>
-                  <a:schemeClr val="accent5"/>
-                </a:solidFill>
-              </a:rPr>
+              <a:rPr lang="en-US" sz="2800" dirty="0" smtClean="0"/>
               <a:t>]</a:t>
             </a:r>
-            <a:endParaRPr lang="en-US" dirty="0">
-              <a:solidFill>
-                <a:schemeClr val="accent5"/>
-              </a:solidFill>
-            </a:endParaRPr>
+            <a:endParaRPr lang="en-US" sz="2800" dirty="0"/>
           </a:p>
         </p:txBody>
       </p:sp>
@@ -4715,6 +4626,13 @@
   <p:clrMapOvr>
     <a:masterClrMapping/>
   </p:clrMapOvr>
+  <p:timing>
+    <p:tnLst>
+      <p:par>
+        <p:cTn id="1" dur="indefinite" restart="never" nodeType="tmRoot"/>
+      </p:par>
+    </p:tnLst>
+  </p:timing>
 </p:sld>
 </file>
 
@@ -4846,8 +4764,8 @@
         </p:nvSpPr>
         <p:spPr>
           <a:xfrm>
-            <a:off x="4907061" y="6354110"/>
-            <a:ext cx="2313710" cy="369332"/>
+            <a:off x="4317989" y="6334780"/>
+            <a:ext cx="3491853" cy="523220"/>
           </a:xfrm>
           <a:prstGeom prst="rect">
             <a:avLst/>
@@ -4860,34 +4778,18 @@
           <a:lstStyle/>
           <a:p>
             <a:r>
-              <a:rPr lang="en-US" dirty="0" smtClean="0">
-                <a:solidFill>
-                  <a:schemeClr val="accent5"/>
-                </a:solidFill>
-              </a:rPr>
+              <a:rPr lang="en-US" sz="2800" dirty="0" smtClean="0"/>
               <a:t>[See: </a:t>
             </a:r>
             <a:r>
-              <a:rPr lang="en-US" dirty="0" err="1" smtClean="0">
-                <a:solidFill>
-                  <a:schemeClr val="accent5"/>
-                </a:solidFill>
-              </a:rPr>
+              <a:rPr lang="en-US" sz="2800" dirty="0" err="1" smtClean="0"/>
               <a:t>levelsimpact.md</a:t>
             </a:r>
             <a:r>
-              <a:rPr lang="en-US" dirty="0" smtClean="0">
-                <a:solidFill>
-                  <a:schemeClr val="accent5"/>
-                </a:solidFill>
-              </a:rPr>
+              <a:rPr lang="en-US" sz="2800" dirty="0" smtClean="0"/>
               <a:t>]</a:t>
             </a:r>
-            <a:endParaRPr lang="en-US" dirty="0">
-              <a:solidFill>
-                <a:schemeClr val="accent5"/>
-              </a:solidFill>
-            </a:endParaRPr>
+            <a:endParaRPr lang="en-US" sz="2800" dirty="0"/>
           </a:p>
         </p:txBody>
       </p:sp>
@@ -4901,6 +4803,13 @@
   <p:clrMapOvr>
     <a:masterClrMapping/>
   </p:clrMapOvr>
+  <p:timing>
+    <p:tnLst>
+      <p:par>
+        <p:cTn id="1" dur="indefinite" restart="never" nodeType="tmRoot"/>
+      </p:par>
+    </p:tnLst>
+  </p:timing>
 </p:sld>
 </file>
 
@@ -4996,8 +4905,8 @@
         </p:nvSpPr>
         <p:spPr>
           <a:xfrm>
-            <a:off x="4940374" y="6305984"/>
-            <a:ext cx="1955985" cy="369332"/>
+            <a:off x="4489931" y="6334780"/>
+            <a:ext cx="2856872" cy="523220"/>
           </a:xfrm>
           <a:prstGeom prst="rect">
             <a:avLst/>
@@ -5010,18 +4919,10 @@
           <a:lstStyle/>
           <a:p>
             <a:r>
-              <a:rPr lang="en-US" dirty="0" smtClean="0">
-                <a:solidFill>
-                  <a:schemeClr val="tx2"/>
-                </a:solidFill>
-              </a:rPr>
+              <a:rPr lang="en-US" sz="2800" dirty="0" smtClean="0"/>
               <a:t>[See: impact1.md]</a:t>
             </a:r>
-            <a:endParaRPr lang="en-US" dirty="0">
-              <a:solidFill>
-                <a:schemeClr val="tx2"/>
-              </a:solidFill>
-            </a:endParaRPr>
+            <a:endParaRPr lang="en-US" sz="2800" dirty="0"/>
           </a:p>
         </p:txBody>
       </p:sp>
@@ -5035,6 +4936,13 @@
   <p:clrMapOvr>
     <a:masterClrMapping/>
   </p:clrMapOvr>
+  <p:timing>
+    <p:tnLst>
+      <p:par>
+        <p:cTn id="1" dur="indefinite" restart="never" nodeType="tmRoot"/>
+      </p:par>
+    </p:tnLst>
+  </p:timing>
 </p:sld>
 </file>
 
@@ -5116,8 +5024,8 @@
         </p:nvSpPr>
         <p:spPr>
           <a:xfrm>
-            <a:off x="4940374" y="6305984"/>
-            <a:ext cx="1955985" cy="369332"/>
+            <a:off x="4667564" y="6334780"/>
+            <a:ext cx="2856872" cy="523220"/>
           </a:xfrm>
           <a:prstGeom prst="rect">
             <a:avLst/>
@@ -5130,18 +5038,10 @@
           <a:lstStyle/>
           <a:p>
             <a:r>
-              <a:rPr lang="en-US" dirty="0" smtClean="0">
-                <a:solidFill>
-                  <a:schemeClr val="accent5"/>
-                </a:solidFill>
-              </a:rPr>
+              <a:rPr lang="en-US" sz="2800" dirty="0" smtClean="0"/>
               <a:t>[See: impact1.md]</a:t>
             </a:r>
-            <a:endParaRPr lang="en-US" dirty="0">
-              <a:solidFill>
-                <a:schemeClr val="accent5"/>
-              </a:solidFill>
-            </a:endParaRPr>
+            <a:endParaRPr lang="en-US" sz="2800" dirty="0"/>
           </a:p>
         </p:txBody>
       </p:sp>
@@ -5155,6 +5055,13 @@
   <p:clrMapOvr>
     <a:masterClrMapping/>
   </p:clrMapOvr>
+  <p:timing>
+    <p:tnLst>
+      <p:par>
+        <p:cTn id="1" dur="indefinite" restart="never" nodeType="tmRoot"/>
+      </p:par>
+    </p:tnLst>
+  </p:timing>
 </p:sld>
 </file>
 
@@ -5304,8 +5211,8 @@
         </p:nvSpPr>
         <p:spPr>
           <a:xfrm>
-            <a:off x="4940374" y="6305984"/>
-            <a:ext cx="1955985" cy="369332"/>
+            <a:off x="4667564" y="6334780"/>
+            <a:ext cx="2856872" cy="523220"/>
           </a:xfrm>
           <a:prstGeom prst="rect">
             <a:avLst/>
@@ -5318,18 +5225,10 @@
           <a:lstStyle/>
           <a:p>
             <a:r>
-              <a:rPr lang="en-US" dirty="0" smtClean="0">
-                <a:solidFill>
-                  <a:schemeClr val="accent5"/>
-                </a:solidFill>
-              </a:rPr>
+              <a:rPr lang="en-US" sz="2800" dirty="0" smtClean="0"/>
               <a:t>[See: impact1.md]</a:t>
             </a:r>
-            <a:endParaRPr lang="en-US" dirty="0">
-              <a:solidFill>
-                <a:schemeClr val="accent5"/>
-              </a:solidFill>
-            </a:endParaRPr>
+            <a:endParaRPr lang="en-US" sz="2800" dirty="0"/>
           </a:p>
         </p:txBody>
       </p:sp>
@@ -5343,6 +5242,13 @@
   <p:clrMapOvr>
     <a:masterClrMapping/>
   </p:clrMapOvr>
+  <p:timing>
+    <p:tnLst>
+      <p:par>
+        <p:cTn id="1" dur="indefinite" restart="never" nodeType="tmRoot"/>
+      </p:par>
+    </p:tnLst>
+  </p:timing>
 </p:sld>
 </file>
 
@@ -5376,18 +5282,20 @@
         <p:spPr>
           <a:xfrm>
             <a:off x="603913" y="1361412"/>
-            <a:ext cx="5630839" cy="1325563"/>
-          </a:xfrm>
-        </p:spPr>
-        <p:txBody>
-          <a:bodyPr/>
-          <a:lstStyle/>
-          <a:p>
-            <a:r>
-              <a:rPr lang="en-US" dirty="0" smtClean="0"/>
+            <a:ext cx="6125500" cy="1325563"/>
+          </a:xfrm>
+        </p:spPr>
+        <p:txBody>
+          <a:bodyPr>
+            <a:noAutofit/>
+          </a:bodyPr>
+          <a:lstStyle/>
+          <a:p>
+            <a:r>
+              <a:rPr lang="en-US" sz="4800" dirty="0" smtClean="0"/>
               <a:t>institutional compliance</a:t>
             </a:r>
-            <a:endParaRPr lang="en-US" dirty="0"/>
+            <a:endParaRPr lang="en-US" sz="4800" dirty="0"/>
           </a:p>
         </p:txBody>
       </p:sp>
@@ -5401,8 +5309,8 @@
         </p:nvSpPr>
         <p:spPr>
           <a:xfrm>
-            <a:off x="5519262" y="4492375"/>
-            <a:ext cx="6078941" cy="1325563"/>
+            <a:off x="5000626" y="4492375"/>
+            <a:ext cx="6597578" cy="1325563"/>
           </a:xfrm>
           <a:prstGeom prst="rect">
             <a:avLst/>
@@ -5410,7 +5318,7 @@
         </p:spPr>
         <p:txBody>
           <a:bodyPr vert="horz" lIns="91440" tIns="45720" rIns="91440" bIns="45720" rtlCol="0" anchor="ctr">
-            <a:normAutofit/>
+            <a:noAutofit/>
           </a:bodyPr>
           <a:lstStyle>
             <a:lvl1pPr algn="l" defTabSz="914400" rtl="0" eaLnBrk="1" latinLnBrk="0" hangingPunct="1">
@@ -5433,14 +5341,14 @@
           </a:lstStyle>
           <a:p>
             <a:r>
-              <a:rPr lang="en-US" dirty="0"/>
+              <a:rPr lang="en-US" sz="4800" dirty="0"/>
               <a:t>e</a:t>
             </a:r>
             <a:r>
-              <a:rPr lang="en-US" dirty="0" smtClean="0"/>
+              <a:rPr lang="en-US" sz="4800" dirty="0" smtClean="0"/>
               <a:t>thics beyond compliance</a:t>
             </a:r>
-            <a:endParaRPr lang="en-US" dirty="0"/>
+            <a:endParaRPr lang="en-US" sz="4800" dirty="0"/>
           </a:p>
         </p:txBody>
       </p:sp>
@@ -5483,8 +5391,8 @@
         </p:nvSpPr>
         <p:spPr>
           <a:xfrm>
-            <a:off x="4943761" y="6356502"/>
-            <a:ext cx="1995354" cy="369332"/>
+            <a:off x="4594018" y="6334780"/>
+            <a:ext cx="3003964" cy="523220"/>
           </a:xfrm>
           <a:prstGeom prst="rect">
             <a:avLst/>
@@ -5497,18 +5405,10 @@
           <a:lstStyle/>
           <a:p>
             <a:r>
-              <a:rPr lang="en-US" dirty="0" smtClean="0">
-                <a:solidFill>
-                  <a:schemeClr val="accent5"/>
-                </a:solidFill>
-              </a:rPr>
+              <a:rPr lang="en-US" sz="2800" dirty="0" smtClean="0"/>
               <a:t>[See: README.MD]</a:t>
             </a:r>
-            <a:endParaRPr lang="en-US" dirty="0">
-              <a:solidFill>
-                <a:schemeClr val="accent5"/>
-              </a:solidFill>
-            </a:endParaRPr>
+            <a:endParaRPr lang="en-US" sz="2800" dirty="0"/>
           </a:p>
         </p:txBody>
       </p:sp>
@@ -5577,15 +5477,7 @@
             </a:r>
             <a:r>
               <a:rPr lang="en-US" sz="3200" smtClean="0"/>
-              <a:t>principle</a:t>
-            </a:r>
-            <a:r>
-              <a:rPr lang="en-US" sz="3200" smtClean="0"/>
-              <a:t>” </a:t>
-            </a:r>
-            <a:r>
-              <a:rPr lang="en-US" sz="3200" smtClean="0"/>
-              <a:t>(</a:t>
+              <a:t>principle” (</a:t>
             </a:r>
             <a:r>
               <a:rPr lang="en-US" sz="3200" dirty="0" smtClean="0"/>
@@ -5632,8 +5524,8 @@
         </p:nvSpPr>
         <p:spPr>
           <a:xfrm>
-            <a:off x="5118006" y="6299583"/>
-            <a:ext cx="1955985" cy="369332"/>
+            <a:off x="4667562" y="6291042"/>
+            <a:ext cx="2856872" cy="523220"/>
           </a:xfrm>
           <a:prstGeom prst="rect">
             <a:avLst/>
@@ -5646,34 +5538,10 @@
           <a:lstStyle/>
           <a:p>
             <a:r>
-              <a:rPr lang="en-US" dirty="0" smtClean="0">
-                <a:solidFill>
-                  <a:schemeClr val="accent5"/>
-                </a:solidFill>
-              </a:rPr>
-              <a:t>[See</a:t>
-            </a:r>
-            <a:r>
-              <a:rPr lang="en-US" smtClean="0">
-                <a:solidFill>
-                  <a:schemeClr val="accent5"/>
-                </a:solidFill>
-              </a:rPr>
-              <a:t>: impact1.md</a:t>
-            </a:r>
-            <a:r>
-              <a:rPr lang="en-US" dirty="0" smtClean="0">
-                <a:solidFill>
-                  <a:schemeClr val="accent5"/>
-                </a:solidFill>
-              </a:rPr>
-              <a:t>]</a:t>
-            </a:r>
-            <a:endParaRPr lang="en-US" dirty="0">
-              <a:solidFill>
-                <a:schemeClr val="accent5"/>
-              </a:solidFill>
-            </a:endParaRPr>
+              <a:rPr lang="en-US" sz="2800" dirty="0" smtClean="0"/>
+              <a:t>[See: impact1.md]</a:t>
+            </a:r>
+            <a:endParaRPr lang="en-US" sz="2800" dirty="0"/>
           </a:p>
         </p:txBody>
       </p:sp>
@@ -5757,6 +5625,13 @@
   <p:clrMapOvr>
     <a:masterClrMapping/>
   </p:clrMapOvr>
+  <p:timing>
+    <p:tnLst>
+      <p:par>
+        <p:cTn id="1" dur="indefinite" restart="never" nodeType="tmRoot"/>
+      </p:par>
+    </p:tnLst>
+  </p:timing>
 </p:sld>
 </file>
 
@@ -5816,8 +5691,8 @@
         </p:nvSpPr>
         <p:spPr>
           <a:xfrm>
-            <a:off x="4937221" y="6322027"/>
-            <a:ext cx="2317558" cy="369332"/>
+            <a:off x="4345200" y="6334780"/>
+            <a:ext cx="3501600" cy="523220"/>
           </a:xfrm>
           <a:prstGeom prst="rect">
             <a:avLst/>
@@ -5830,34 +5705,10 @@
           <a:lstStyle/>
           <a:p>
             <a:r>
-              <a:rPr lang="en-US" dirty="0" smtClean="0">
-                <a:solidFill>
-                  <a:schemeClr val="accent5"/>
-                </a:solidFill>
-              </a:rPr>
-              <a:t>[See</a:t>
-            </a:r>
-            <a:r>
-              <a:rPr lang="en-US" smtClean="0">
-                <a:solidFill>
-                  <a:schemeClr val="accent5"/>
-                </a:solidFill>
-              </a:rPr>
-              <a:t>: impact1cont.md</a:t>
-            </a:r>
-            <a:r>
-              <a:rPr lang="en-US" dirty="0" smtClean="0">
-                <a:solidFill>
-                  <a:schemeClr val="accent5"/>
-                </a:solidFill>
-              </a:rPr>
-              <a:t>]</a:t>
-            </a:r>
-            <a:endParaRPr lang="en-US" dirty="0">
-              <a:solidFill>
-                <a:schemeClr val="accent5"/>
-              </a:solidFill>
-            </a:endParaRPr>
+              <a:rPr lang="en-US" sz="2800" dirty="0" smtClean="0"/>
+              <a:t>[See: impact1cont.md]</a:t>
+            </a:r>
+            <a:endParaRPr lang="en-US" sz="2800" dirty="0"/>
           </a:p>
         </p:txBody>
       </p:sp>
@@ -5871,6 +5722,13 @@
   <p:clrMapOvr>
     <a:masterClrMapping/>
   </p:clrMapOvr>
+  <p:timing>
+    <p:tnLst>
+      <p:par>
+        <p:cTn id="1" dur="indefinite" restart="never" nodeType="tmRoot"/>
+      </p:par>
+    </p:tnLst>
+  </p:timing>
 </p:sld>
 </file>
 
@@ -5934,8 +5792,8 @@
         </p:nvSpPr>
         <p:spPr>
           <a:xfrm>
-            <a:off x="4937221" y="6322027"/>
-            <a:ext cx="2317558" cy="369332"/>
+            <a:off x="4345200" y="6334780"/>
+            <a:ext cx="3501600" cy="523220"/>
           </a:xfrm>
           <a:prstGeom prst="rect">
             <a:avLst/>
@@ -5948,18 +5806,10 @@
           <a:lstStyle/>
           <a:p>
             <a:r>
-              <a:rPr lang="en-US" dirty="0" smtClean="0">
-                <a:solidFill>
-                  <a:schemeClr val="accent5"/>
-                </a:solidFill>
-              </a:rPr>
+              <a:rPr lang="en-US" sz="2800" dirty="0" smtClean="0"/>
               <a:t>[See: impact1cont.md]</a:t>
             </a:r>
-            <a:endParaRPr lang="en-US" dirty="0">
-              <a:solidFill>
-                <a:schemeClr val="accent5"/>
-              </a:solidFill>
-            </a:endParaRPr>
+            <a:endParaRPr lang="en-US" sz="2800" dirty="0"/>
           </a:p>
         </p:txBody>
       </p:sp>
@@ -5973,6 +5823,13 @@
   <p:clrMapOvr>
     <a:masterClrMapping/>
   </p:clrMapOvr>
+  <p:timing>
+    <p:tnLst>
+      <p:par>
+        <p:cTn id="1" dur="indefinite" restart="never" nodeType="tmRoot"/>
+      </p:par>
+    </p:tnLst>
+  </p:timing>
 </p:sld>
 </file>
 
@@ -6365,8 +6222,8 @@
         </p:nvSpPr>
         <p:spPr>
           <a:xfrm>
-            <a:off x="4930871" y="6344289"/>
-            <a:ext cx="2317558" cy="369332"/>
+            <a:off x="4338850" y="6334780"/>
+            <a:ext cx="3501600" cy="523220"/>
           </a:xfrm>
           <a:prstGeom prst="rect">
             <a:avLst/>
@@ -6379,30 +6236,14 @@
           <a:lstStyle/>
           <a:p>
             <a:r>
-              <a:rPr lang="en-US" dirty="0" smtClean="0">
+              <a:rPr lang="en-US" sz="2800" dirty="0" smtClean="0">
                 <a:solidFill>
                   <a:schemeClr val="tx2"/>
                 </a:solidFill>
               </a:rPr>
-              <a:t>[See</a:t>
-            </a:r>
-            <a:r>
-              <a:rPr lang="en-US" smtClean="0">
-                <a:solidFill>
-                  <a:schemeClr val="tx2"/>
-                </a:solidFill>
-              </a:rPr>
-              <a:t>: impact1cont.md</a:t>
-            </a:r>
-            <a:r>
-              <a:rPr lang="en-US" dirty="0" smtClean="0">
-                <a:solidFill>
-                  <a:schemeClr val="tx2"/>
-                </a:solidFill>
-              </a:rPr>
-              <a:t>]</a:t>
-            </a:r>
-            <a:endParaRPr lang="en-US" dirty="0">
+              <a:t>[See: impact1cont.md]</a:t>
+            </a:r>
+            <a:endParaRPr lang="en-US" sz="2800" dirty="0">
               <a:solidFill>
                 <a:schemeClr val="tx2"/>
               </a:solidFill>
@@ -6420,6 +6261,13 @@
   <p:clrMapOvr>
     <a:masterClrMapping/>
   </p:clrMapOvr>
+  <p:timing>
+    <p:tnLst>
+      <p:par>
+        <p:cTn id="1" dur="indefinite" restart="never" nodeType="tmRoot"/>
+      </p:par>
+    </p:tnLst>
+  </p:timing>
 </p:sld>
 </file>
 
@@ -6493,11 +6341,7 @@
             </a:br>
             <a:r>
               <a:rPr lang="en-US" dirty="0" smtClean="0"/>
-              <a:t>the </a:t>
-            </a:r>
-            <a:r>
-              <a:rPr lang="en-US" dirty="0" smtClean="0"/>
-              <a:t>ramifications of (re)producing categories</a:t>
+              <a:t>the ramifications of (re)producing categories</a:t>
             </a:r>
             <a:endParaRPr lang="en-US" dirty="0"/>
           </a:p>
@@ -6511,8 +6355,8 @@
         </p:nvSpPr>
         <p:spPr>
           <a:xfrm>
-            <a:off x="5087138" y="6322027"/>
-            <a:ext cx="1903085" cy="369332"/>
+            <a:off x="4489931" y="6334780"/>
+            <a:ext cx="2856872" cy="523220"/>
           </a:xfrm>
           <a:prstGeom prst="rect">
             <a:avLst/>
@@ -6525,14 +6369,14 @@
           <a:lstStyle/>
           <a:p>
             <a:r>
-              <a:rPr lang="en-US" dirty="0" smtClean="0">
+              <a:rPr lang="en-US" sz="2800" dirty="0" smtClean="0">
                 <a:solidFill>
                   <a:schemeClr val="tx2"/>
                 </a:solidFill>
               </a:rPr>
               <a:t>[See: impact2.md]</a:t>
             </a:r>
-            <a:endParaRPr lang="en-US" dirty="0">
+            <a:endParaRPr lang="en-US" sz="2800" dirty="0">
               <a:solidFill>
                 <a:schemeClr val="tx2"/>
               </a:solidFill>
@@ -6550,6 +6394,13 @@
   <p:clrMapOvr>
     <a:masterClrMapping/>
   </p:clrMapOvr>
+  <p:timing>
+    <p:tnLst>
+      <p:par>
+        <p:cTn id="1" dur="indefinite" restart="never" nodeType="tmRoot"/>
+      </p:par>
+    </p:tnLst>
+  </p:timing>
 </p:sld>
 </file>
 
@@ -6644,8 +6495,8 @@
         </p:nvSpPr>
         <p:spPr>
           <a:xfrm>
-            <a:off x="5087138" y="6322027"/>
-            <a:ext cx="1903085" cy="369332"/>
+            <a:off x="4610245" y="6334780"/>
+            <a:ext cx="2856872" cy="523220"/>
           </a:xfrm>
           <a:prstGeom prst="rect">
             <a:avLst/>
@@ -6658,18 +6509,10 @@
           <a:lstStyle/>
           <a:p>
             <a:r>
-              <a:rPr lang="en-US" dirty="0" smtClean="0">
-                <a:solidFill>
-                  <a:schemeClr val="accent5"/>
-                </a:solidFill>
-              </a:rPr>
+              <a:rPr lang="en-US" sz="2800" dirty="0" smtClean="0"/>
               <a:t>[See: impact2.md]</a:t>
             </a:r>
-            <a:endParaRPr lang="en-US" dirty="0">
-              <a:solidFill>
-                <a:schemeClr val="accent5"/>
-              </a:solidFill>
-            </a:endParaRPr>
+            <a:endParaRPr lang="en-US" sz="2800" dirty="0"/>
           </a:p>
         </p:txBody>
       </p:sp>
@@ -6683,6 +6526,13 @@
   <p:clrMapOvr>
     <a:masterClrMapping/>
   </p:clrMapOvr>
+  <p:timing>
+    <p:tnLst>
+      <p:par>
+        <p:cTn id="1" dur="indefinite" restart="never" nodeType="tmRoot"/>
+      </p:par>
+    </p:tnLst>
+  </p:timing>
 </p:sld>
 </file>
 
@@ -6739,8 +6589,8 @@
         </p:nvSpPr>
         <p:spPr>
           <a:xfrm>
-            <a:off x="5087138" y="6322027"/>
-            <a:ext cx="1903085" cy="369332"/>
+            <a:off x="4724491" y="6334780"/>
+            <a:ext cx="2856872" cy="523220"/>
           </a:xfrm>
           <a:prstGeom prst="rect">
             <a:avLst/>
@@ -6753,34 +6603,10 @@
           <a:lstStyle/>
           <a:p>
             <a:r>
-              <a:rPr lang="en-US" dirty="0" smtClean="0">
-                <a:solidFill>
-                  <a:schemeClr val="accent5"/>
-                </a:solidFill>
-              </a:rPr>
-              <a:t>[See</a:t>
-            </a:r>
-            <a:r>
-              <a:rPr lang="en-US" smtClean="0">
-                <a:solidFill>
-                  <a:schemeClr val="accent5"/>
-                </a:solidFill>
-              </a:rPr>
-              <a:t>: impact2.md</a:t>
-            </a:r>
-            <a:r>
-              <a:rPr lang="en-US" dirty="0" smtClean="0">
-                <a:solidFill>
-                  <a:schemeClr val="accent5"/>
-                </a:solidFill>
-              </a:rPr>
-              <a:t>]</a:t>
-            </a:r>
-            <a:endParaRPr lang="en-US" dirty="0">
-              <a:solidFill>
-                <a:schemeClr val="accent5"/>
-              </a:solidFill>
-            </a:endParaRPr>
+              <a:rPr lang="en-US" sz="2800" dirty="0" smtClean="0"/>
+              <a:t>[See: impact2.md]</a:t>
+            </a:r>
+            <a:endParaRPr lang="en-US" sz="2800" dirty="0"/>
           </a:p>
         </p:txBody>
       </p:sp>
@@ -6794,6 +6620,13 @@
   <p:clrMapOvr>
     <a:masterClrMapping/>
   </p:clrMapOvr>
+  <p:timing>
+    <p:tnLst>
+      <p:par>
+        <p:cTn id="1" dur="indefinite" restart="never" nodeType="tmRoot"/>
+      </p:par>
+    </p:tnLst>
+  </p:timing>
 </p:sld>
 </file>
 
@@ -6853,8 +6686,8 @@
         </p:nvSpPr>
         <p:spPr>
           <a:xfrm>
-            <a:off x="5087138" y="6322027"/>
-            <a:ext cx="1903085" cy="369332"/>
+            <a:off x="4667564" y="6334780"/>
+            <a:ext cx="2856872" cy="523220"/>
           </a:xfrm>
           <a:prstGeom prst="rect">
             <a:avLst/>
@@ -6867,34 +6700,10 @@
           <a:lstStyle/>
           <a:p>
             <a:r>
-              <a:rPr lang="en-US" dirty="0" smtClean="0">
-                <a:solidFill>
-                  <a:schemeClr val="accent5"/>
-                </a:solidFill>
-              </a:rPr>
-              <a:t>[See</a:t>
-            </a:r>
-            <a:r>
-              <a:rPr lang="en-US" smtClean="0">
-                <a:solidFill>
-                  <a:schemeClr val="accent5"/>
-                </a:solidFill>
-              </a:rPr>
-              <a:t>: impact2.md</a:t>
-            </a:r>
-            <a:r>
-              <a:rPr lang="en-US" dirty="0" smtClean="0">
-                <a:solidFill>
-                  <a:schemeClr val="accent5"/>
-                </a:solidFill>
-              </a:rPr>
-              <a:t>]</a:t>
-            </a:r>
-            <a:endParaRPr lang="en-US" dirty="0">
-              <a:solidFill>
-                <a:schemeClr val="accent5"/>
-              </a:solidFill>
-            </a:endParaRPr>
+              <a:rPr lang="en-US" sz="2800" dirty="0" smtClean="0"/>
+              <a:t>[See: impact2.md]</a:t>
+            </a:r>
+            <a:endParaRPr lang="en-US" sz="2800" dirty="0"/>
           </a:p>
         </p:txBody>
       </p:sp>
@@ -6908,6 +6717,13 @@
   <p:clrMapOvr>
     <a:masterClrMapping/>
   </p:clrMapOvr>
+  <p:timing>
+    <p:tnLst>
+      <p:par>
+        <p:cTn id="1" dur="indefinite" restart="never" nodeType="tmRoot"/>
+      </p:par>
+    </p:tnLst>
+  </p:timing>
 </p:sld>
 </file>
 
@@ -6967,8 +6783,8 @@
         </p:nvSpPr>
         <p:spPr>
           <a:xfrm>
-            <a:off x="4937221" y="6338069"/>
-            <a:ext cx="2317558" cy="369332"/>
+            <a:off x="4345200" y="6334780"/>
+            <a:ext cx="3501600" cy="523220"/>
           </a:xfrm>
           <a:prstGeom prst="rect">
             <a:avLst/>
@@ -6981,34 +6797,10 @@
           <a:lstStyle/>
           <a:p>
             <a:r>
-              <a:rPr lang="en-US" dirty="0" smtClean="0">
-                <a:solidFill>
-                  <a:schemeClr val="accent5"/>
-                </a:solidFill>
-              </a:rPr>
-              <a:t>[See</a:t>
-            </a:r>
-            <a:r>
-              <a:rPr lang="en-US" smtClean="0">
-                <a:solidFill>
-                  <a:schemeClr val="accent5"/>
-                </a:solidFill>
-              </a:rPr>
-              <a:t>: impact2cont.md</a:t>
-            </a:r>
-            <a:r>
-              <a:rPr lang="en-US" dirty="0" smtClean="0">
-                <a:solidFill>
-                  <a:schemeClr val="accent5"/>
-                </a:solidFill>
-              </a:rPr>
-              <a:t>]</a:t>
-            </a:r>
-            <a:endParaRPr lang="en-US" dirty="0">
-              <a:solidFill>
-                <a:schemeClr val="accent5"/>
-              </a:solidFill>
-            </a:endParaRPr>
+              <a:rPr lang="en-US" sz="2800" dirty="0" smtClean="0"/>
+              <a:t>[See: impact2cont.md]</a:t>
+            </a:r>
+            <a:endParaRPr lang="en-US" sz="2800" dirty="0"/>
           </a:p>
         </p:txBody>
       </p:sp>
@@ -7022,6 +6814,13 @@
   <p:clrMapOvr>
     <a:masterClrMapping/>
   </p:clrMapOvr>
+  <p:timing>
+    <p:tnLst>
+      <p:par>
+        <p:cTn id="1" dur="indefinite" restart="never" nodeType="tmRoot"/>
+      </p:par>
+    </p:tnLst>
+  </p:timing>
 </p:sld>
 </file>
 
@@ -7149,8 +6948,8 @@
         </p:nvSpPr>
         <p:spPr>
           <a:xfrm>
-            <a:off x="4937221" y="6338069"/>
-            <a:ext cx="2317558" cy="369332"/>
+            <a:off x="4284213" y="6334780"/>
+            <a:ext cx="3501600" cy="523220"/>
           </a:xfrm>
           <a:prstGeom prst="rect">
             <a:avLst/>
@@ -7163,34 +6962,10 @@
           <a:lstStyle/>
           <a:p>
             <a:r>
-              <a:rPr lang="en-US" dirty="0" smtClean="0">
-                <a:solidFill>
-                  <a:schemeClr val="accent5"/>
-                </a:solidFill>
-              </a:rPr>
-              <a:t>[See</a:t>
-            </a:r>
-            <a:r>
-              <a:rPr lang="en-US" smtClean="0">
-                <a:solidFill>
-                  <a:schemeClr val="accent5"/>
-                </a:solidFill>
-              </a:rPr>
-              <a:t>: impact2cont.md</a:t>
-            </a:r>
-            <a:r>
-              <a:rPr lang="en-US" dirty="0" smtClean="0">
-                <a:solidFill>
-                  <a:schemeClr val="accent5"/>
-                </a:solidFill>
-              </a:rPr>
-              <a:t>]</a:t>
-            </a:r>
-            <a:endParaRPr lang="en-US" dirty="0">
-              <a:solidFill>
-                <a:schemeClr val="accent5"/>
-              </a:solidFill>
-            </a:endParaRPr>
+              <a:rPr lang="en-US" sz="2800" dirty="0" smtClean="0"/>
+              <a:t>[See: impact2cont.md]</a:t>
+            </a:r>
+            <a:endParaRPr lang="en-US" sz="2800" dirty="0"/>
           </a:p>
         </p:txBody>
       </p:sp>
@@ -7204,6 +6979,13 @@
   <p:clrMapOvr>
     <a:masterClrMapping/>
   </p:clrMapOvr>
+  <p:timing>
+    <p:tnLst>
+      <p:par>
+        <p:cTn id="1" dur="indefinite" restart="never" nodeType="tmRoot"/>
+      </p:par>
+    </p:tnLst>
+  </p:timing>
 </p:sld>
 </file>
 
@@ -7276,8 +7058,8 @@
         </p:nvSpPr>
         <p:spPr>
           <a:xfrm>
-            <a:off x="4943761" y="6356502"/>
-            <a:ext cx="2304477" cy="369332"/>
+            <a:off x="4247078" y="6334780"/>
+            <a:ext cx="3479479" cy="523220"/>
           </a:xfrm>
           <a:prstGeom prst="rect">
             <a:avLst/>
@@ -7290,34 +7072,18 @@
           <a:lstStyle/>
           <a:p>
             <a:r>
-              <a:rPr lang="en-US" dirty="0" smtClean="0">
-                <a:solidFill>
-                  <a:schemeClr val="accent5"/>
-                </a:solidFill>
-              </a:rPr>
+              <a:rPr lang="en-US" sz="2800" dirty="0" smtClean="0"/>
               <a:t>[See: </a:t>
             </a:r>
             <a:r>
-              <a:rPr lang="en-US" dirty="0" err="1" smtClean="0">
-                <a:solidFill>
-                  <a:schemeClr val="accent5"/>
-                </a:solidFill>
-              </a:rPr>
+              <a:rPr lang="en-US" sz="2800" dirty="0" err="1" smtClean="0"/>
               <a:t>introduction.md</a:t>
             </a:r>
             <a:r>
-              <a:rPr lang="en-US" dirty="0" smtClean="0">
-                <a:solidFill>
-                  <a:schemeClr val="accent5"/>
-                </a:solidFill>
-              </a:rPr>
+              <a:rPr lang="en-US" sz="2800" dirty="0" smtClean="0"/>
               <a:t>]</a:t>
             </a:r>
-            <a:endParaRPr lang="en-US" dirty="0">
-              <a:solidFill>
-                <a:schemeClr val="accent5"/>
-              </a:solidFill>
-            </a:endParaRPr>
+            <a:endParaRPr lang="en-US" sz="2800" dirty="0"/>
           </a:p>
         </p:txBody>
       </p:sp>
@@ -7331,6 +7097,13 @@
   <p:clrMapOvr>
     <a:masterClrMapping/>
   </p:clrMapOvr>
+  <p:timing>
+    <p:tnLst>
+      <p:par>
+        <p:cTn id="1" dur="indefinite" restart="never" nodeType="tmRoot"/>
+      </p:par>
+    </p:tnLst>
+  </p:timing>
 </p:sld>
 </file>
 
@@ -7394,8 +7167,8 @@
         </p:nvSpPr>
         <p:spPr>
           <a:xfrm>
-            <a:off x="4833212" y="6370153"/>
-            <a:ext cx="2317558" cy="369332"/>
+            <a:off x="3928984" y="6334780"/>
+            <a:ext cx="3501600" cy="523220"/>
           </a:xfrm>
           <a:prstGeom prst="rect">
             <a:avLst/>
@@ -7408,34 +7181,10 @@
           <a:lstStyle/>
           <a:p>
             <a:r>
-              <a:rPr lang="en-US" dirty="0" smtClean="0">
-                <a:solidFill>
-                  <a:schemeClr val="accent5"/>
-                </a:solidFill>
-              </a:rPr>
-              <a:t>[See</a:t>
-            </a:r>
-            <a:r>
-              <a:rPr lang="en-US" smtClean="0">
-                <a:solidFill>
-                  <a:schemeClr val="accent5"/>
-                </a:solidFill>
-              </a:rPr>
-              <a:t>: impact2cont.md</a:t>
-            </a:r>
-            <a:r>
-              <a:rPr lang="en-US" dirty="0" smtClean="0">
-                <a:solidFill>
-                  <a:schemeClr val="accent5"/>
-                </a:solidFill>
-              </a:rPr>
-              <a:t>]</a:t>
-            </a:r>
-            <a:endParaRPr lang="en-US" dirty="0">
-              <a:solidFill>
-                <a:schemeClr val="accent5"/>
-              </a:solidFill>
-            </a:endParaRPr>
+              <a:rPr lang="en-US" sz="2800" dirty="0" smtClean="0"/>
+              <a:t>[See: impact2cont.md]</a:t>
+            </a:r>
+            <a:endParaRPr lang="en-US" sz="2800" dirty="0"/>
           </a:p>
         </p:txBody>
       </p:sp>
@@ -7605,6 +7354,13 @@
   <p:clrMapOvr>
     <a:masterClrMapping/>
   </p:clrMapOvr>
+  <p:timing>
+    <p:tnLst>
+      <p:par>
+        <p:cTn id="1" dur="indefinite" restart="never" nodeType="tmRoot"/>
+      </p:par>
+    </p:tnLst>
+  </p:timing>
 </p:sld>
 </file>
 
@@ -7676,8 +7432,8 @@
         </p:nvSpPr>
         <p:spPr>
           <a:xfrm>
-            <a:off x="4937221" y="6338069"/>
-            <a:ext cx="2317558" cy="369332"/>
+            <a:off x="4345200" y="6334780"/>
+            <a:ext cx="3501600" cy="523220"/>
           </a:xfrm>
           <a:prstGeom prst="rect">
             <a:avLst/>
@@ -7690,34 +7446,10 @@
           <a:lstStyle/>
           <a:p>
             <a:r>
-              <a:rPr lang="en-US" dirty="0" smtClean="0">
-                <a:solidFill>
-                  <a:schemeClr val="accent5"/>
-                </a:solidFill>
-              </a:rPr>
-              <a:t>[See</a:t>
-            </a:r>
-            <a:r>
-              <a:rPr lang="en-US" smtClean="0">
-                <a:solidFill>
-                  <a:schemeClr val="accent5"/>
-                </a:solidFill>
-              </a:rPr>
-              <a:t>: impact2cont.md</a:t>
-            </a:r>
-            <a:r>
-              <a:rPr lang="en-US" dirty="0" smtClean="0">
-                <a:solidFill>
-                  <a:schemeClr val="accent5"/>
-                </a:solidFill>
-              </a:rPr>
-              <a:t>]</a:t>
-            </a:r>
-            <a:endParaRPr lang="en-US" dirty="0">
-              <a:solidFill>
-                <a:schemeClr val="accent5"/>
-              </a:solidFill>
-            </a:endParaRPr>
+              <a:rPr lang="en-US" sz="2800" dirty="0" smtClean="0"/>
+              <a:t>[See: impact2cont.md]</a:t>
+            </a:r>
+            <a:endParaRPr lang="en-US" sz="2800" dirty="0"/>
           </a:p>
         </p:txBody>
       </p:sp>
@@ -7731,6 +7463,13 @@
   <p:clrMapOvr>
     <a:masterClrMapping/>
   </p:clrMapOvr>
+  <p:timing>
+    <p:tnLst>
+      <p:par>
+        <p:cTn id="1" dur="indefinite" restart="never" nodeType="tmRoot"/>
+      </p:par>
+    </p:tnLst>
+  </p:timing>
 </p:sld>
 </file>
 
@@ -7975,10 +7714,6 @@
               <a:rPr lang="en-US" sz="3200" dirty="0" smtClean="0"/>
               <a:t>” (Joyner 2016)?</a:t>
             </a:r>
-            <a:r>
-              <a:rPr lang="en-US" sz="3200" dirty="0" smtClean="0"/>
-              <a:t/>
-            </a:r>
             <a:br>
               <a:rPr lang="en-US" sz="3200" dirty="0" smtClean="0"/>
             </a:br>
@@ -8031,8 +7766,8 @@
         </p:nvSpPr>
         <p:spPr>
           <a:xfrm>
-            <a:off x="4930871" y="6344289"/>
-            <a:ext cx="2317558" cy="369332"/>
+            <a:off x="4338850" y="6334780"/>
+            <a:ext cx="3501600" cy="523220"/>
           </a:xfrm>
           <a:prstGeom prst="rect">
             <a:avLst/>
@@ -8045,30 +7780,14 @@
           <a:lstStyle/>
           <a:p>
             <a:r>
-              <a:rPr lang="en-US" dirty="0" smtClean="0">
+              <a:rPr lang="en-US" sz="2800" dirty="0" smtClean="0">
                 <a:solidFill>
                   <a:schemeClr val="tx2"/>
                 </a:solidFill>
               </a:rPr>
-              <a:t>[See: </a:t>
-            </a:r>
-            <a:r>
-              <a:rPr lang="en-US" dirty="0" smtClean="0">
-                <a:solidFill>
-                  <a:schemeClr val="tx2"/>
-                </a:solidFill>
-              </a:rPr>
-              <a:t>impact2cont.md</a:t>
-            </a:r>
-            <a:r>
-              <a:rPr lang="en-US" dirty="0" smtClean="0">
-                <a:solidFill>
-                  <a:schemeClr val="tx2"/>
-                </a:solidFill>
-              </a:rPr>
-              <a:t>]</a:t>
-            </a:r>
-            <a:endParaRPr lang="en-US" dirty="0">
+              <a:t>[See: impact2cont.md]</a:t>
+            </a:r>
+            <a:endParaRPr lang="en-US" sz="2800" dirty="0">
               <a:solidFill>
                 <a:schemeClr val="tx2"/>
               </a:solidFill>
@@ -8086,6 +7805,13 @@
   <p:clrMapOvr>
     <a:masterClrMapping/>
   </p:clrMapOvr>
+  <p:timing>
+    <p:tnLst>
+      <p:par>
+        <p:cTn id="1" dur="indefinite" restart="never" nodeType="tmRoot"/>
+      </p:par>
+    </p:tnLst>
+  </p:timing>
 </p:sld>
 </file>
 
@@ -8172,8 +7898,8 @@
         </p:nvSpPr>
         <p:spPr>
           <a:xfrm>
-            <a:off x="5087138" y="6322027"/>
-            <a:ext cx="1903085" cy="369332"/>
+            <a:off x="4489931" y="6334780"/>
+            <a:ext cx="2856872" cy="523220"/>
           </a:xfrm>
           <a:prstGeom prst="rect">
             <a:avLst/>
@@ -8186,14 +7912,14 @@
           <a:lstStyle/>
           <a:p>
             <a:r>
-              <a:rPr lang="en-US" dirty="0" smtClean="0">
+              <a:rPr lang="en-US" sz="2800" dirty="0" smtClean="0">
                 <a:solidFill>
                   <a:schemeClr val="tx2"/>
                 </a:solidFill>
               </a:rPr>
               <a:t>[See: impact3.md]</a:t>
             </a:r>
-            <a:endParaRPr lang="en-US" dirty="0">
+            <a:endParaRPr lang="en-US" sz="2800" dirty="0">
               <a:solidFill>
                 <a:schemeClr val="tx2"/>
               </a:solidFill>
@@ -8211,6 +7937,13 @@
   <p:clrMapOvr>
     <a:masterClrMapping/>
   </p:clrMapOvr>
+  <p:timing>
+    <p:tnLst>
+      <p:par>
+        <p:cTn id="1" dur="indefinite" restart="never" nodeType="tmRoot"/>
+      </p:par>
+    </p:tnLst>
+  </p:timing>
 </p:sld>
 </file>
 
@@ -8326,8 +8059,8 @@
         </p:nvSpPr>
         <p:spPr>
           <a:xfrm>
-            <a:off x="4937221" y="6338069"/>
-            <a:ext cx="1903085" cy="369332"/>
+            <a:off x="4667564" y="6334780"/>
+            <a:ext cx="2856872" cy="523220"/>
           </a:xfrm>
           <a:prstGeom prst="rect">
             <a:avLst/>
@@ -8340,18 +8073,10 @@
           <a:lstStyle/>
           <a:p>
             <a:r>
-              <a:rPr lang="en-US" dirty="0" smtClean="0">
-                <a:solidFill>
-                  <a:schemeClr val="accent5"/>
-                </a:solidFill>
-              </a:rPr>
+              <a:rPr lang="en-US" sz="2800" dirty="0" smtClean="0"/>
               <a:t>[See: impact3.md]</a:t>
             </a:r>
-            <a:endParaRPr lang="en-US" dirty="0">
-              <a:solidFill>
-                <a:schemeClr val="accent5"/>
-              </a:solidFill>
-            </a:endParaRPr>
+            <a:endParaRPr lang="en-US" sz="2800" dirty="0"/>
           </a:p>
         </p:txBody>
       </p:sp>
@@ -8365,6 +8090,13 @@
   <p:clrMapOvr>
     <a:masterClrMapping/>
   </p:clrMapOvr>
+  <p:timing>
+    <p:tnLst>
+      <p:par>
+        <p:cTn id="1" dur="indefinite" restart="never" nodeType="tmRoot"/>
+      </p:par>
+    </p:tnLst>
+  </p:timing>
 </p:sld>
 </file>
 
@@ -8452,8 +8184,8 @@
         </p:nvSpPr>
         <p:spPr>
           <a:xfrm>
-            <a:off x="4937221" y="6338069"/>
-            <a:ext cx="1903085" cy="369332"/>
+            <a:off x="4667564" y="6334780"/>
+            <a:ext cx="2856872" cy="523220"/>
           </a:xfrm>
           <a:prstGeom prst="rect">
             <a:avLst/>
@@ -8466,18 +8198,10 @@
           <a:lstStyle/>
           <a:p>
             <a:r>
-              <a:rPr lang="en-US" dirty="0" smtClean="0">
-                <a:solidFill>
-                  <a:schemeClr val="accent5"/>
-                </a:solidFill>
-              </a:rPr>
+              <a:rPr lang="en-US" sz="2800" dirty="0" smtClean="0"/>
               <a:t>[See: impact3.md]</a:t>
             </a:r>
-            <a:endParaRPr lang="en-US" dirty="0">
-              <a:solidFill>
-                <a:schemeClr val="accent5"/>
-              </a:solidFill>
-            </a:endParaRPr>
+            <a:endParaRPr lang="en-US" sz="2800" dirty="0"/>
           </a:p>
         </p:txBody>
       </p:sp>
@@ -8491,6 +8215,13 @@
   <p:clrMapOvr>
     <a:masterClrMapping/>
   </p:clrMapOvr>
+  <p:timing>
+    <p:tnLst>
+      <p:par>
+        <p:cTn id="1" dur="indefinite" restart="never" nodeType="tmRoot"/>
+      </p:par>
+    </p:tnLst>
+  </p:timing>
 </p:sld>
 </file>
 
@@ -8566,8 +8297,8 @@
         </p:nvSpPr>
         <p:spPr>
           <a:xfrm>
-            <a:off x="4937221" y="6338069"/>
-            <a:ext cx="1903085" cy="369332"/>
+            <a:off x="4667564" y="6334780"/>
+            <a:ext cx="2856872" cy="523220"/>
           </a:xfrm>
           <a:prstGeom prst="rect">
             <a:avLst/>
@@ -8580,18 +8311,10 @@
           <a:lstStyle/>
           <a:p>
             <a:r>
-              <a:rPr lang="en-US" dirty="0" smtClean="0">
-                <a:solidFill>
-                  <a:schemeClr val="accent5"/>
-                </a:solidFill>
-              </a:rPr>
+              <a:rPr lang="en-US" sz="2800" dirty="0" smtClean="0"/>
               <a:t>[See: impact3.md]</a:t>
             </a:r>
-            <a:endParaRPr lang="en-US" dirty="0">
-              <a:solidFill>
-                <a:schemeClr val="accent5"/>
-              </a:solidFill>
-            </a:endParaRPr>
+            <a:endParaRPr lang="en-US" sz="2800" dirty="0"/>
           </a:p>
         </p:txBody>
       </p:sp>
@@ -8605,6 +8328,13 @@
   <p:clrMapOvr>
     <a:masterClrMapping/>
   </p:clrMapOvr>
+  <p:timing>
+    <p:tnLst>
+      <p:par>
+        <p:cTn id="1" dur="indefinite" restart="never" nodeType="tmRoot"/>
+      </p:par>
+    </p:tnLst>
+  </p:timing>
 </p:sld>
 </file>
 
@@ -8687,8 +8417,8 @@
         </p:nvSpPr>
         <p:spPr>
           <a:xfrm>
-            <a:off x="5144456" y="6300814"/>
-            <a:ext cx="1903085" cy="369332"/>
+            <a:off x="4667564" y="6320477"/>
+            <a:ext cx="2856872" cy="523220"/>
           </a:xfrm>
           <a:prstGeom prst="rect">
             <a:avLst/>
@@ -8701,34 +8431,10 @@
           <a:lstStyle/>
           <a:p>
             <a:r>
-              <a:rPr lang="en-US" dirty="0" smtClean="0">
-                <a:solidFill>
-                  <a:schemeClr val="accent5"/>
-                </a:solidFill>
-              </a:rPr>
-              <a:t>[See</a:t>
-            </a:r>
-            <a:r>
-              <a:rPr lang="en-US" smtClean="0">
-                <a:solidFill>
-                  <a:schemeClr val="accent5"/>
-                </a:solidFill>
-              </a:rPr>
-              <a:t>: impact3.md</a:t>
-            </a:r>
-            <a:r>
-              <a:rPr lang="en-US" dirty="0" smtClean="0">
-                <a:solidFill>
-                  <a:schemeClr val="accent5"/>
-                </a:solidFill>
-              </a:rPr>
-              <a:t>]</a:t>
-            </a:r>
-            <a:endParaRPr lang="en-US" dirty="0">
-              <a:solidFill>
-                <a:schemeClr val="accent5"/>
-              </a:solidFill>
-            </a:endParaRPr>
+              <a:rPr lang="en-US" sz="2800" dirty="0" smtClean="0"/>
+              <a:t>[See: impact3.md]</a:t>
+            </a:r>
+            <a:endParaRPr lang="en-US" sz="2800" dirty="0"/>
           </a:p>
         </p:txBody>
       </p:sp>
@@ -8799,6 +8505,13 @@
   <p:clrMapOvr>
     <a:masterClrMapping/>
   </p:clrMapOvr>
+  <p:timing>
+    <p:tnLst>
+      <p:par>
+        <p:cTn id="1" dur="indefinite" restart="never" nodeType="tmRoot"/>
+      </p:par>
+    </p:tnLst>
+  </p:timing>
 </p:sld>
 </file>
 
@@ -9015,8 +8728,8 @@
         </p:nvSpPr>
         <p:spPr>
           <a:xfrm>
-            <a:off x="5138107" y="6360332"/>
-            <a:ext cx="1903085" cy="369332"/>
+            <a:off x="4661214" y="6334780"/>
+            <a:ext cx="2856872" cy="523220"/>
           </a:xfrm>
           <a:prstGeom prst="rect">
             <a:avLst/>
@@ -9029,30 +8742,14 @@
           <a:lstStyle/>
           <a:p>
             <a:r>
-              <a:rPr lang="en-US" dirty="0" smtClean="0">
+              <a:rPr lang="en-US" sz="2800" dirty="0" smtClean="0">
                 <a:solidFill>
                   <a:schemeClr val="tx2"/>
                 </a:solidFill>
               </a:rPr>
-              <a:t>[See</a:t>
-            </a:r>
-            <a:r>
-              <a:rPr lang="en-US" smtClean="0">
-                <a:solidFill>
-                  <a:schemeClr val="tx2"/>
-                </a:solidFill>
-              </a:rPr>
-              <a:t>: impact3.md</a:t>
-            </a:r>
-            <a:r>
-              <a:rPr lang="en-US" dirty="0" smtClean="0">
-                <a:solidFill>
-                  <a:schemeClr val="tx2"/>
-                </a:solidFill>
-              </a:rPr>
-              <a:t>]</a:t>
-            </a:r>
-            <a:endParaRPr lang="en-US" dirty="0">
+              <a:t>[See: impact3.md]</a:t>
+            </a:r>
+            <a:endParaRPr lang="en-US" sz="2800" dirty="0">
               <a:solidFill>
                 <a:schemeClr val="tx2"/>
               </a:solidFill>
@@ -9070,6 +8767,13 @@
   <p:clrMapOvr>
     <a:masterClrMapping/>
   </p:clrMapOvr>
+  <p:timing>
+    <p:tnLst>
+      <p:par>
+        <p:cTn id="1" dur="indefinite" restart="never" nodeType="tmRoot"/>
+      </p:par>
+    </p:tnLst>
+  </p:timing>
 </p:sld>
 </file>
 
@@ -9153,8 +8857,8 @@
         </p:nvSpPr>
         <p:spPr>
           <a:xfrm>
-            <a:off x="5082272" y="6338070"/>
-            <a:ext cx="1672189" cy="369332"/>
+            <a:off x="4671295" y="6334780"/>
+            <a:ext cx="2494144" cy="523220"/>
           </a:xfrm>
           <a:prstGeom prst="rect">
             <a:avLst/>
@@ -9167,34 +8871,18 @@
           <a:lstStyle/>
           <a:p>
             <a:r>
-              <a:rPr lang="en-US" dirty="0" smtClean="0">
-                <a:solidFill>
-                  <a:schemeClr val="tx2"/>
-                </a:solidFill>
-              </a:rPr>
+              <a:rPr lang="en-US" sz="2800" dirty="0" smtClean="0"/>
               <a:t>[See: </a:t>
             </a:r>
             <a:r>
-              <a:rPr lang="en-US" dirty="0" err="1" smtClean="0">
-                <a:solidFill>
-                  <a:schemeClr val="tx2"/>
-                </a:solidFill>
-              </a:rPr>
+              <a:rPr lang="en-US" sz="2800" dirty="0" err="1" smtClean="0"/>
               <a:t>range.md</a:t>
             </a:r>
             <a:r>
-              <a:rPr lang="en-US" dirty="0" smtClean="0">
-                <a:solidFill>
-                  <a:schemeClr val="tx2"/>
-                </a:solidFill>
-              </a:rPr>
+              <a:rPr lang="en-US" sz="2800" dirty="0" smtClean="0"/>
               <a:t>]</a:t>
             </a:r>
-            <a:endParaRPr lang="en-US" dirty="0">
-              <a:solidFill>
-                <a:schemeClr val="tx2"/>
-              </a:solidFill>
-            </a:endParaRPr>
+            <a:endParaRPr lang="en-US" sz="2800" dirty="0"/>
           </a:p>
         </p:txBody>
       </p:sp>
@@ -9208,6 +8896,13 @@
   <p:clrMapOvr>
     <a:masterClrMapping/>
   </p:clrMapOvr>
+  <p:timing>
+    <p:tnLst>
+      <p:par>
+        <p:cTn id="1" dur="indefinite" restart="never" nodeType="tmRoot"/>
+      </p:par>
+    </p:tnLst>
+  </p:timing>
 </p:sld>
 </file>
 
@@ -9259,8 +8954,8 @@
         </p:nvSpPr>
         <p:spPr>
           <a:xfrm>
-            <a:off x="4943761" y="6356502"/>
-            <a:ext cx="2304477" cy="369332"/>
+            <a:off x="4356260" y="6334780"/>
+            <a:ext cx="3479479" cy="523220"/>
           </a:xfrm>
           <a:prstGeom prst="rect">
             <a:avLst/>
@@ -9273,34 +8968,18 @@
           <a:lstStyle/>
           <a:p>
             <a:r>
-              <a:rPr lang="en-US" dirty="0" smtClean="0">
-                <a:solidFill>
-                  <a:schemeClr val="accent5"/>
-                </a:solidFill>
-              </a:rPr>
+              <a:rPr lang="en-US" sz="2800" dirty="0" smtClean="0"/>
               <a:t>[See: </a:t>
             </a:r>
             <a:r>
-              <a:rPr lang="en-US" dirty="0" err="1" smtClean="0">
-                <a:solidFill>
-                  <a:schemeClr val="accent5"/>
-                </a:solidFill>
-              </a:rPr>
+              <a:rPr lang="en-US" sz="2800" dirty="0" err="1" smtClean="0"/>
               <a:t>introduction.md</a:t>
             </a:r>
             <a:r>
-              <a:rPr lang="en-US" dirty="0" smtClean="0">
-                <a:solidFill>
-                  <a:schemeClr val="accent5"/>
-                </a:solidFill>
-              </a:rPr>
+              <a:rPr lang="en-US" sz="2800" dirty="0" smtClean="0"/>
               <a:t>]</a:t>
             </a:r>
-            <a:endParaRPr lang="en-US" dirty="0">
-              <a:solidFill>
-                <a:schemeClr val="accent5"/>
-              </a:solidFill>
-            </a:endParaRPr>
+            <a:endParaRPr lang="en-US" sz="2800" dirty="0"/>
           </a:p>
         </p:txBody>
       </p:sp>
@@ -9314,6 +8993,13 @@
   <p:clrMapOvr>
     <a:masterClrMapping/>
   </p:clrMapOvr>
+  <p:timing>
+    <p:tnLst>
+      <p:par>
+        <p:cTn id="1" dur="indefinite" restart="never" nodeType="tmRoot"/>
+      </p:par>
+    </p:tnLst>
+  </p:timing>
 </p:sld>
 </file>
 
@@ -9388,8 +9074,8 @@
         </p:nvSpPr>
         <p:spPr>
           <a:xfrm>
-            <a:off x="5259905" y="6338069"/>
-            <a:ext cx="1672189" cy="369332"/>
+            <a:off x="4848928" y="6334780"/>
+            <a:ext cx="2494144" cy="523220"/>
           </a:xfrm>
           <a:prstGeom prst="rect">
             <a:avLst/>
@@ -9402,34 +9088,18 @@
           <a:lstStyle/>
           <a:p>
             <a:r>
-              <a:rPr lang="en-US" dirty="0" smtClean="0">
-                <a:solidFill>
-                  <a:schemeClr val="accent5"/>
-                </a:solidFill>
-              </a:rPr>
+              <a:rPr lang="en-US" sz="2800" dirty="0" smtClean="0"/>
               <a:t>[See: </a:t>
             </a:r>
             <a:r>
-              <a:rPr lang="en-US" dirty="0" err="1" smtClean="0">
-                <a:solidFill>
-                  <a:schemeClr val="accent5"/>
-                </a:solidFill>
-              </a:rPr>
+              <a:rPr lang="en-US" sz="2800" dirty="0" err="1" smtClean="0"/>
               <a:t>range.md</a:t>
             </a:r>
             <a:r>
-              <a:rPr lang="en-US" dirty="0" smtClean="0">
-                <a:solidFill>
-                  <a:schemeClr val="accent5"/>
-                </a:solidFill>
-              </a:rPr>
+              <a:rPr lang="en-US" sz="2800" dirty="0" smtClean="0"/>
               <a:t>]</a:t>
             </a:r>
-            <a:endParaRPr lang="en-US" dirty="0">
-              <a:solidFill>
-                <a:schemeClr val="accent5"/>
-              </a:solidFill>
-            </a:endParaRPr>
+            <a:endParaRPr lang="en-US" sz="2800" dirty="0"/>
           </a:p>
         </p:txBody>
       </p:sp>
@@ -9443,6 +9113,13 @@
   <p:clrMapOvr>
     <a:masterClrMapping/>
   </p:clrMapOvr>
+  <p:timing>
+    <p:tnLst>
+      <p:par>
+        <p:cTn id="1" dur="indefinite" restart="never" nodeType="tmRoot"/>
+      </p:par>
+    </p:tnLst>
+  </p:timing>
 </p:sld>
 </file>
 
@@ -9502,8 +9179,8 @@
         </p:nvSpPr>
         <p:spPr>
           <a:xfrm>
-            <a:off x="5259905" y="6338069"/>
-            <a:ext cx="1672189" cy="369332"/>
+            <a:off x="4848928" y="6334780"/>
+            <a:ext cx="2494144" cy="523220"/>
           </a:xfrm>
           <a:prstGeom prst="rect">
             <a:avLst/>
@@ -9516,34 +9193,18 @@
           <a:lstStyle/>
           <a:p>
             <a:r>
-              <a:rPr lang="en-US" dirty="0" smtClean="0">
-                <a:solidFill>
-                  <a:schemeClr val="accent5"/>
-                </a:solidFill>
-              </a:rPr>
+              <a:rPr lang="en-US" sz="2800" dirty="0" smtClean="0"/>
               <a:t>[See: </a:t>
             </a:r>
             <a:r>
-              <a:rPr lang="en-US" dirty="0" err="1" smtClean="0">
-                <a:solidFill>
-                  <a:schemeClr val="accent5"/>
-                </a:solidFill>
-              </a:rPr>
+              <a:rPr lang="en-US" sz="2800" dirty="0" err="1" smtClean="0"/>
               <a:t>range.md</a:t>
             </a:r>
             <a:r>
-              <a:rPr lang="en-US" dirty="0" smtClean="0">
-                <a:solidFill>
-                  <a:schemeClr val="accent5"/>
-                </a:solidFill>
-              </a:rPr>
+              <a:rPr lang="en-US" sz="2800" dirty="0" smtClean="0"/>
               <a:t>]</a:t>
             </a:r>
-            <a:endParaRPr lang="en-US" dirty="0">
-              <a:solidFill>
-                <a:schemeClr val="accent5"/>
-              </a:solidFill>
-            </a:endParaRPr>
+            <a:endParaRPr lang="en-US" sz="2800" dirty="0"/>
           </a:p>
         </p:txBody>
       </p:sp>
@@ -9557,6 +9218,13 @@
   <p:clrMapOvr>
     <a:masterClrMapping/>
   </p:clrMapOvr>
+  <p:timing>
+    <p:tnLst>
+      <p:par>
+        <p:cTn id="1" dur="indefinite" restart="never" nodeType="tmRoot"/>
+      </p:par>
+    </p:tnLst>
+  </p:timing>
 </p:sld>
 </file>
 
@@ -9616,8 +9284,8 @@
         </p:nvSpPr>
         <p:spPr>
           <a:xfrm>
-            <a:off x="5259905" y="6338069"/>
-            <a:ext cx="1672189" cy="369332"/>
+            <a:off x="4848928" y="6334780"/>
+            <a:ext cx="2494144" cy="523220"/>
           </a:xfrm>
           <a:prstGeom prst="rect">
             <a:avLst/>
@@ -9630,34 +9298,18 @@
           <a:lstStyle/>
           <a:p>
             <a:r>
-              <a:rPr lang="en-US" dirty="0" smtClean="0">
-                <a:solidFill>
-                  <a:schemeClr val="accent5"/>
-                </a:solidFill>
-              </a:rPr>
+              <a:rPr lang="en-US" sz="2800" dirty="0" smtClean="0"/>
               <a:t>[See: </a:t>
             </a:r>
             <a:r>
-              <a:rPr lang="en-US" dirty="0" err="1" smtClean="0">
-                <a:solidFill>
-                  <a:schemeClr val="accent5"/>
-                </a:solidFill>
-              </a:rPr>
+              <a:rPr lang="en-US" sz="2800" dirty="0" err="1" smtClean="0"/>
               <a:t>range.md</a:t>
             </a:r>
             <a:r>
-              <a:rPr lang="en-US" dirty="0" smtClean="0">
-                <a:solidFill>
-                  <a:schemeClr val="accent5"/>
-                </a:solidFill>
-              </a:rPr>
+              <a:rPr lang="en-US" sz="2800" dirty="0" smtClean="0"/>
               <a:t>]</a:t>
             </a:r>
-            <a:endParaRPr lang="en-US" dirty="0">
-              <a:solidFill>
-                <a:schemeClr val="accent5"/>
-              </a:solidFill>
-            </a:endParaRPr>
+            <a:endParaRPr lang="en-US" sz="2800" dirty="0"/>
           </a:p>
         </p:txBody>
       </p:sp>
@@ -9671,6 +9323,13 @@
   <p:clrMapOvr>
     <a:masterClrMapping/>
   </p:clrMapOvr>
+  <p:timing>
+    <p:tnLst>
+      <p:par>
+        <p:cTn id="1" dur="indefinite" restart="never" nodeType="tmRoot"/>
+      </p:par>
+    </p:tnLst>
+  </p:timing>
 </p:sld>
 </file>
 
@@ -9730,8 +9389,8 @@
         </p:nvSpPr>
         <p:spPr>
           <a:xfrm>
-            <a:off x="5259905" y="6338069"/>
-            <a:ext cx="1672189" cy="369332"/>
+            <a:off x="4848928" y="6334780"/>
+            <a:ext cx="2494144" cy="523220"/>
           </a:xfrm>
           <a:prstGeom prst="rect">
             <a:avLst/>
@@ -9744,34 +9403,18 @@
           <a:lstStyle/>
           <a:p>
             <a:r>
-              <a:rPr lang="en-US" dirty="0" smtClean="0">
-                <a:solidFill>
-                  <a:schemeClr val="accent5"/>
-                </a:solidFill>
-              </a:rPr>
+              <a:rPr lang="en-US" sz="2800" dirty="0" smtClean="0"/>
               <a:t>[See: </a:t>
             </a:r>
             <a:r>
-              <a:rPr lang="en-US" dirty="0" err="1" smtClean="0">
-                <a:solidFill>
-                  <a:schemeClr val="accent5"/>
-                </a:solidFill>
-              </a:rPr>
+              <a:rPr lang="en-US" sz="2800" dirty="0" err="1" smtClean="0"/>
               <a:t>range.md</a:t>
             </a:r>
             <a:r>
-              <a:rPr lang="en-US" dirty="0" smtClean="0">
-                <a:solidFill>
-                  <a:schemeClr val="accent5"/>
-                </a:solidFill>
-              </a:rPr>
+              <a:rPr lang="en-US" sz="2800" dirty="0" smtClean="0"/>
               <a:t>]</a:t>
             </a:r>
-            <a:endParaRPr lang="en-US" dirty="0">
-              <a:solidFill>
-                <a:schemeClr val="accent5"/>
-              </a:solidFill>
-            </a:endParaRPr>
+            <a:endParaRPr lang="en-US" sz="2800" dirty="0"/>
           </a:p>
         </p:txBody>
       </p:sp>
@@ -9785,6 +9428,13 @@
   <p:clrMapOvr>
     <a:masterClrMapping/>
   </p:clrMapOvr>
+  <p:timing>
+    <p:tnLst>
+      <p:par>
+        <p:cTn id="1" dur="indefinite" restart="never" nodeType="tmRoot"/>
+      </p:par>
+    </p:tnLst>
+  </p:timing>
 </p:sld>
 </file>
 
@@ -9860,8 +9510,8 @@
         </p:nvSpPr>
         <p:spPr>
           <a:xfrm>
-            <a:off x="5259905" y="6338069"/>
-            <a:ext cx="1672189" cy="369332"/>
+            <a:off x="4848928" y="6334780"/>
+            <a:ext cx="2494144" cy="523220"/>
           </a:xfrm>
           <a:prstGeom prst="rect">
             <a:avLst/>
@@ -9874,34 +9524,18 @@
           <a:lstStyle/>
           <a:p>
             <a:r>
-              <a:rPr lang="en-US" dirty="0" smtClean="0">
-                <a:solidFill>
-                  <a:schemeClr val="accent5"/>
-                </a:solidFill>
-              </a:rPr>
+              <a:rPr lang="en-US" sz="2800" dirty="0" smtClean="0"/>
               <a:t>[See: </a:t>
             </a:r>
             <a:r>
-              <a:rPr lang="en-US" dirty="0" err="1" smtClean="0">
-                <a:solidFill>
-                  <a:schemeClr val="accent5"/>
-                </a:solidFill>
-              </a:rPr>
+              <a:rPr lang="en-US" sz="2800" dirty="0" err="1" smtClean="0"/>
               <a:t>range.md</a:t>
             </a:r>
             <a:r>
-              <a:rPr lang="en-US" dirty="0" smtClean="0">
-                <a:solidFill>
-                  <a:schemeClr val="accent5"/>
-                </a:solidFill>
-              </a:rPr>
+              <a:rPr lang="en-US" sz="2800" dirty="0" smtClean="0"/>
               <a:t>]</a:t>
             </a:r>
-            <a:endParaRPr lang="en-US" dirty="0">
-              <a:solidFill>
-                <a:schemeClr val="accent5"/>
-              </a:solidFill>
-            </a:endParaRPr>
+            <a:endParaRPr lang="en-US" sz="2800" dirty="0"/>
           </a:p>
         </p:txBody>
       </p:sp>
@@ -9915,6 +9549,13 @@
   <p:clrMapOvr>
     <a:masterClrMapping/>
   </p:clrMapOvr>
+  <p:timing>
+    <p:tnLst>
+      <p:par>
+        <p:cTn id="1" dur="indefinite" restart="never" nodeType="tmRoot"/>
+      </p:par>
+    </p:tnLst>
+  </p:timing>
 </p:sld>
 </file>
 
@@ -9974,8 +9615,8 @@
         </p:nvSpPr>
         <p:spPr>
           <a:xfrm>
-            <a:off x="5259905" y="6338069"/>
-            <a:ext cx="1672189" cy="369332"/>
+            <a:off x="4848928" y="6334780"/>
+            <a:ext cx="2494144" cy="523220"/>
           </a:xfrm>
           <a:prstGeom prst="rect">
             <a:avLst/>
@@ -9988,34 +9629,18 @@
           <a:lstStyle/>
           <a:p>
             <a:r>
-              <a:rPr lang="en-US" dirty="0" smtClean="0">
-                <a:solidFill>
-                  <a:schemeClr val="accent5"/>
-                </a:solidFill>
-              </a:rPr>
+              <a:rPr lang="en-US" sz="2800" dirty="0" smtClean="0"/>
               <a:t>[See: </a:t>
             </a:r>
             <a:r>
-              <a:rPr lang="en-US" dirty="0" err="1" smtClean="0">
-                <a:solidFill>
-                  <a:schemeClr val="accent5"/>
-                </a:solidFill>
-              </a:rPr>
+              <a:rPr lang="en-US" sz="2800" dirty="0" err="1" smtClean="0"/>
               <a:t>range.md</a:t>
             </a:r>
             <a:r>
-              <a:rPr lang="en-US" dirty="0" smtClean="0">
-                <a:solidFill>
-                  <a:schemeClr val="accent5"/>
-                </a:solidFill>
-              </a:rPr>
+              <a:rPr lang="en-US" sz="2800" dirty="0" smtClean="0"/>
               <a:t>]</a:t>
             </a:r>
-            <a:endParaRPr lang="en-US" dirty="0">
-              <a:solidFill>
-                <a:schemeClr val="accent5"/>
-              </a:solidFill>
-            </a:endParaRPr>
+            <a:endParaRPr lang="en-US" sz="2800" dirty="0"/>
           </a:p>
         </p:txBody>
       </p:sp>
@@ -10029,6 +9654,13 @@
   <p:clrMapOvr>
     <a:masterClrMapping/>
   </p:clrMapOvr>
+  <p:timing>
+    <p:tnLst>
+      <p:par>
+        <p:cTn id="1" dur="indefinite" restart="never" nodeType="tmRoot"/>
+      </p:par>
+    </p:tnLst>
+  </p:timing>
 </p:sld>
 </file>
 
@@ -10100,8 +9732,8 @@
         </p:nvSpPr>
         <p:spPr>
           <a:xfrm>
-            <a:off x="5259905" y="6338069"/>
-            <a:ext cx="1672189" cy="369332"/>
+            <a:off x="4848928" y="6334780"/>
+            <a:ext cx="2494144" cy="523220"/>
           </a:xfrm>
           <a:prstGeom prst="rect">
             <a:avLst/>
@@ -10114,34 +9746,18 @@
           <a:lstStyle/>
           <a:p>
             <a:r>
-              <a:rPr lang="en-US" dirty="0" smtClean="0">
-                <a:solidFill>
-                  <a:schemeClr val="accent5"/>
-                </a:solidFill>
-              </a:rPr>
+              <a:rPr lang="en-US" sz="2800" dirty="0" smtClean="0"/>
               <a:t>[See: </a:t>
             </a:r>
             <a:r>
-              <a:rPr lang="en-US" dirty="0" err="1" smtClean="0">
-                <a:solidFill>
-                  <a:schemeClr val="accent5"/>
-                </a:solidFill>
-              </a:rPr>
+              <a:rPr lang="en-US" sz="2800" dirty="0" err="1" smtClean="0"/>
               <a:t>range.md</a:t>
             </a:r>
             <a:r>
-              <a:rPr lang="en-US" dirty="0" smtClean="0">
-                <a:solidFill>
-                  <a:schemeClr val="accent5"/>
-                </a:solidFill>
-              </a:rPr>
+              <a:rPr lang="en-US" sz="2800" dirty="0" smtClean="0"/>
               <a:t>]</a:t>
             </a:r>
-            <a:endParaRPr lang="en-US" dirty="0">
-              <a:solidFill>
-                <a:schemeClr val="accent5"/>
-              </a:solidFill>
-            </a:endParaRPr>
+            <a:endParaRPr lang="en-US" sz="2800" dirty="0"/>
           </a:p>
         </p:txBody>
       </p:sp>
@@ -10155,6 +9771,13 @@
   <p:clrMapOvr>
     <a:masterClrMapping/>
   </p:clrMapOvr>
+  <p:timing>
+    <p:tnLst>
+      <p:par>
+        <p:cTn id="1" dur="indefinite" restart="never" nodeType="tmRoot"/>
+      </p:par>
+    </p:tnLst>
+  </p:timing>
 </p:sld>
 </file>
 
@@ -10226,8 +9849,8 @@
         </p:nvSpPr>
         <p:spPr>
           <a:xfrm>
-            <a:off x="5259905" y="6338069"/>
-            <a:ext cx="1672189" cy="369332"/>
+            <a:off x="4848928" y="6334780"/>
+            <a:ext cx="2494144" cy="523220"/>
           </a:xfrm>
           <a:prstGeom prst="rect">
             <a:avLst/>
@@ -10240,34 +9863,18 @@
           <a:lstStyle/>
           <a:p>
             <a:r>
-              <a:rPr lang="en-US" dirty="0" smtClean="0">
-                <a:solidFill>
-                  <a:schemeClr val="accent5"/>
-                </a:solidFill>
-              </a:rPr>
+              <a:rPr lang="en-US" sz="2800" dirty="0" smtClean="0"/>
               <a:t>[See: </a:t>
             </a:r>
             <a:r>
-              <a:rPr lang="en-US" dirty="0" err="1" smtClean="0">
-                <a:solidFill>
-                  <a:schemeClr val="accent5"/>
-                </a:solidFill>
-              </a:rPr>
+              <a:rPr lang="en-US" sz="2800" dirty="0" err="1" smtClean="0"/>
               <a:t>range.md</a:t>
             </a:r>
             <a:r>
-              <a:rPr lang="en-US" dirty="0" smtClean="0">
-                <a:solidFill>
-                  <a:schemeClr val="accent5"/>
-                </a:solidFill>
-              </a:rPr>
+              <a:rPr lang="en-US" sz="2800" dirty="0" smtClean="0"/>
               <a:t>]</a:t>
             </a:r>
-            <a:endParaRPr lang="en-US" dirty="0">
-              <a:solidFill>
-                <a:schemeClr val="accent5"/>
-              </a:solidFill>
-            </a:endParaRPr>
+            <a:endParaRPr lang="en-US" sz="2800" dirty="0"/>
           </a:p>
         </p:txBody>
       </p:sp>
@@ -10281,6 +9888,13 @@
   <p:clrMapOvr>
     <a:masterClrMapping/>
   </p:clrMapOvr>
+  <p:timing>
+    <p:tnLst>
+      <p:par>
+        <p:cTn id="1" dur="indefinite" restart="never" nodeType="tmRoot"/>
+      </p:par>
+    </p:tnLst>
+  </p:timing>
 </p:sld>
 </file>
 
@@ -10511,8 +10125,8 @@
         </p:nvSpPr>
         <p:spPr>
           <a:xfrm>
-            <a:off x="5253555" y="6264079"/>
-            <a:ext cx="1672189" cy="369332"/>
+            <a:off x="4842578" y="6334780"/>
+            <a:ext cx="2494144" cy="523220"/>
           </a:xfrm>
           <a:prstGeom prst="rect">
             <a:avLst/>
@@ -10525,34 +10139,18 @@
           <a:lstStyle/>
           <a:p>
             <a:r>
-              <a:rPr lang="en-US" dirty="0" smtClean="0">
-                <a:solidFill>
-                  <a:schemeClr val="tx2"/>
-                </a:solidFill>
-              </a:rPr>
+              <a:rPr lang="en-US" sz="2800" dirty="0" smtClean="0"/>
               <a:t>[See: </a:t>
             </a:r>
             <a:r>
-              <a:rPr lang="en-US" dirty="0" err="1" smtClean="0">
-                <a:solidFill>
-                  <a:schemeClr val="tx2"/>
-                </a:solidFill>
-              </a:rPr>
+              <a:rPr lang="en-US" sz="2800" dirty="0" err="1" smtClean="0"/>
               <a:t>range.md</a:t>
             </a:r>
             <a:r>
-              <a:rPr lang="en-US" dirty="0" smtClean="0">
-                <a:solidFill>
-                  <a:schemeClr val="tx2"/>
-                </a:solidFill>
-              </a:rPr>
+              <a:rPr lang="en-US" sz="2800" dirty="0" smtClean="0"/>
               <a:t>]</a:t>
             </a:r>
-            <a:endParaRPr lang="en-US" dirty="0">
-              <a:solidFill>
-                <a:schemeClr val="tx2"/>
-              </a:solidFill>
-            </a:endParaRPr>
+            <a:endParaRPr lang="en-US" sz="2800" dirty="0"/>
           </a:p>
         </p:txBody>
       </p:sp>
@@ -10566,6 +10164,13 @@
   <p:clrMapOvr>
     <a:masterClrMapping/>
   </p:clrMapOvr>
+  <p:timing>
+    <p:tnLst>
+      <p:par>
+        <p:cTn id="1" dur="indefinite" restart="never" nodeType="tmRoot"/>
+      </p:par>
+    </p:tnLst>
+  </p:timing>
 </p:sld>
 </file>
 
@@ -10649,8 +10254,8 @@
         </p:nvSpPr>
         <p:spPr>
           <a:xfrm>
-            <a:off x="3771357" y="6354111"/>
-            <a:ext cx="4649286" cy="369332"/>
+            <a:off x="2531178" y="6334780"/>
+            <a:ext cx="7129644" cy="523220"/>
           </a:xfrm>
           <a:prstGeom prst="rect">
             <a:avLst/>
@@ -10663,66 +10268,34 @@
           <a:lstStyle/>
           <a:p>
             <a:r>
-              <a:rPr lang="en-US" dirty="0" smtClean="0">
-                <a:solidFill>
-                  <a:schemeClr val="accent5"/>
-                </a:solidFill>
-              </a:rPr>
+              <a:rPr lang="en-US" sz="2800" dirty="0" smtClean="0"/>
               <a:t>[See: </a:t>
             </a:r>
             <a:r>
-              <a:rPr lang="en-US" dirty="0" err="1" smtClean="0">
-                <a:solidFill>
-                  <a:schemeClr val="accent5"/>
-                </a:solidFill>
-              </a:rPr>
+              <a:rPr lang="en-US" sz="2800" dirty="0" err="1" smtClean="0"/>
               <a:t>cases.md</a:t>
             </a:r>
             <a:r>
-              <a:rPr lang="en-US" dirty="0" smtClean="0">
-                <a:solidFill>
-                  <a:schemeClr val="accent5"/>
-                </a:solidFill>
-              </a:rPr>
+              <a:rPr lang="en-US" sz="2800" dirty="0" smtClean="0"/>
               <a:t>, </a:t>
             </a:r>
             <a:r>
-              <a:rPr lang="en-US" dirty="0" err="1" smtClean="0">
-                <a:solidFill>
-                  <a:schemeClr val="accent5"/>
-                </a:solidFill>
-              </a:rPr>
+              <a:rPr lang="en-US" sz="2800" dirty="0" err="1" smtClean="0"/>
               <a:t>glossary.md</a:t>
             </a:r>
             <a:r>
-              <a:rPr lang="en-US" dirty="0" smtClean="0">
-                <a:solidFill>
-                  <a:schemeClr val="accent5"/>
-                </a:solidFill>
-              </a:rPr>
+              <a:rPr lang="en-US" sz="2800" dirty="0" smtClean="0"/>
               <a:t>, and </a:t>
             </a:r>
             <a:r>
-              <a:rPr lang="en-US" dirty="0" err="1" smtClean="0">
-                <a:solidFill>
-                  <a:schemeClr val="accent5"/>
-                </a:solidFill>
-              </a:rPr>
+              <a:rPr lang="en-US" sz="2800" dirty="0" err="1" smtClean="0"/>
               <a:t>resources.md</a:t>
             </a:r>
             <a:r>
-              <a:rPr lang="en-US" dirty="0" smtClean="0">
-                <a:solidFill>
-                  <a:schemeClr val="accent5"/>
-                </a:solidFill>
-              </a:rPr>
+              <a:rPr lang="en-US" sz="2800" dirty="0" smtClean="0"/>
               <a:t>]</a:t>
             </a:r>
-            <a:endParaRPr lang="en-US" dirty="0">
-              <a:solidFill>
-                <a:schemeClr val="accent5"/>
-              </a:solidFill>
-            </a:endParaRPr>
+            <a:endParaRPr lang="en-US" sz="2800" dirty="0"/>
           </a:p>
         </p:txBody>
       </p:sp>
@@ -10736,6 +10309,13 @@
   <p:clrMapOvr>
     <a:masterClrMapping/>
   </p:clrMapOvr>
+  <p:timing>
+    <p:tnLst>
+      <p:par>
+        <p:cTn id="1" dur="indefinite" restart="never" nodeType="tmRoot"/>
+      </p:par>
+    </p:tnLst>
+  </p:timing>
 </p:sld>
 </file>
 
@@ -10801,8 +10381,8 @@
         </p:nvSpPr>
         <p:spPr>
           <a:xfrm>
-            <a:off x="4943761" y="6356502"/>
-            <a:ext cx="2304477" cy="369332"/>
+            <a:off x="4356259" y="6334780"/>
+            <a:ext cx="3479479" cy="523220"/>
           </a:xfrm>
           <a:prstGeom prst="rect">
             <a:avLst/>
@@ -10815,34 +10395,18 @@
           <a:lstStyle/>
           <a:p>
             <a:r>
-              <a:rPr lang="en-US" dirty="0" smtClean="0">
-                <a:solidFill>
-                  <a:schemeClr val="accent5"/>
-                </a:solidFill>
-              </a:rPr>
+              <a:rPr lang="en-US" sz="2800" dirty="0" smtClean="0"/>
               <a:t>[See: </a:t>
             </a:r>
             <a:r>
-              <a:rPr lang="en-US" dirty="0" err="1" smtClean="0">
-                <a:solidFill>
-                  <a:schemeClr val="accent5"/>
-                </a:solidFill>
-              </a:rPr>
+              <a:rPr lang="en-US" sz="2800" dirty="0" err="1" smtClean="0"/>
               <a:t>introduction.md</a:t>
             </a:r>
             <a:r>
-              <a:rPr lang="en-US" dirty="0" smtClean="0">
-                <a:solidFill>
-                  <a:schemeClr val="accent5"/>
-                </a:solidFill>
-              </a:rPr>
+              <a:rPr lang="en-US" sz="2800" dirty="0" smtClean="0"/>
               <a:t>]</a:t>
             </a:r>
-            <a:endParaRPr lang="en-US" dirty="0">
-              <a:solidFill>
-                <a:schemeClr val="accent5"/>
-              </a:solidFill>
-            </a:endParaRPr>
+            <a:endParaRPr lang="en-US" sz="2800" dirty="0"/>
           </a:p>
         </p:txBody>
       </p:sp>
@@ -10856,6 +10420,13 @@
   <p:clrMapOvr>
     <a:masterClrMapping/>
   </p:clrMapOvr>
+  <p:timing>
+    <p:tnLst>
+      <p:par>
+        <p:cTn id="1" dur="indefinite" restart="never" nodeType="tmRoot"/>
+      </p:par>
+    </p:tnLst>
+  </p:timing>
 </p:sld>
 </file>
 
@@ -11020,8 +10591,8 @@
         </p:nvSpPr>
         <p:spPr>
           <a:xfrm>
-            <a:off x="5218259" y="6273901"/>
-            <a:ext cx="1755481" cy="369332"/>
+            <a:off x="4784423" y="6334780"/>
+            <a:ext cx="2623154" cy="523220"/>
           </a:xfrm>
           <a:prstGeom prst="rect">
             <a:avLst/>
@@ -11034,34 +10605,18 @@
           <a:lstStyle/>
           <a:p>
             <a:r>
-              <a:rPr lang="en-US" dirty="0" smtClean="0">
-                <a:solidFill>
-                  <a:schemeClr val="accent5"/>
-                </a:solidFill>
-              </a:rPr>
+              <a:rPr lang="en-US" sz="2800" dirty="0" smtClean="0"/>
               <a:t>[See: </a:t>
             </a:r>
             <a:r>
-              <a:rPr lang="en-US" dirty="0" err="1" smtClean="0">
-                <a:solidFill>
-                  <a:schemeClr val="accent5"/>
-                </a:solidFill>
-              </a:rPr>
+              <a:rPr lang="en-US" sz="2800" dirty="0" err="1" smtClean="0"/>
               <a:t>review.md</a:t>
             </a:r>
             <a:r>
-              <a:rPr lang="en-US" dirty="0" smtClean="0">
-                <a:solidFill>
-                  <a:schemeClr val="accent5"/>
-                </a:solidFill>
-              </a:rPr>
+              <a:rPr lang="en-US" sz="2800" dirty="0" smtClean="0"/>
               <a:t>]</a:t>
             </a:r>
-            <a:endParaRPr lang="en-US" dirty="0">
-              <a:solidFill>
-                <a:schemeClr val="accent5"/>
-              </a:solidFill>
-            </a:endParaRPr>
+            <a:endParaRPr lang="en-US" sz="2800" dirty="0"/>
           </a:p>
         </p:txBody>
       </p:sp>
@@ -11075,6 +10630,13 @@
   <p:clrMapOvr>
     <a:masterClrMapping/>
   </p:clrMapOvr>
+  <p:timing>
+    <p:tnLst>
+      <p:par>
+        <p:cTn id="1" dur="indefinite" restart="never" nodeType="tmRoot"/>
+      </p:par>
+    </p:tnLst>
+  </p:timing>
 </p:sld>
 </file>
 
@@ -11194,8 +10756,8 @@
         </p:nvSpPr>
         <p:spPr>
           <a:xfrm>
-            <a:off x="5218259" y="6273901"/>
-            <a:ext cx="1755481" cy="369332"/>
+            <a:off x="4784423" y="6334780"/>
+            <a:ext cx="2623154" cy="523220"/>
           </a:xfrm>
           <a:prstGeom prst="rect">
             <a:avLst/>
@@ -11208,34 +10770,18 @@
           <a:lstStyle/>
           <a:p>
             <a:r>
-              <a:rPr lang="en-US" dirty="0" smtClean="0">
-                <a:solidFill>
-                  <a:schemeClr val="accent5"/>
-                </a:solidFill>
-              </a:rPr>
+              <a:rPr lang="en-US" sz="2800" dirty="0" smtClean="0"/>
               <a:t>[See: </a:t>
             </a:r>
             <a:r>
-              <a:rPr lang="en-US" dirty="0" err="1" smtClean="0">
-                <a:solidFill>
-                  <a:schemeClr val="accent5"/>
-                </a:solidFill>
-              </a:rPr>
+              <a:rPr lang="en-US" sz="2800" dirty="0" err="1" smtClean="0"/>
               <a:t>review.md</a:t>
             </a:r>
             <a:r>
-              <a:rPr lang="en-US" dirty="0" smtClean="0">
-                <a:solidFill>
-                  <a:schemeClr val="accent5"/>
-                </a:solidFill>
-              </a:rPr>
+              <a:rPr lang="en-US" sz="2800" dirty="0" smtClean="0"/>
               <a:t>]</a:t>
             </a:r>
-            <a:endParaRPr lang="en-US" dirty="0">
-              <a:solidFill>
-                <a:schemeClr val="accent5"/>
-              </a:solidFill>
-            </a:endParaRPr>
+            <a:endParaRPr lang="en-US" sz="2800" dirty="0"/>
           </a:p>
         </p:txBody>
       </p:sp>
@@ -11315,67 +10861,35 @@
           <a:lstStyle/>
           <a:p>
             <a:r>
-              <a:rPr lang="en-US" dirty="0" smtClean="0">
-                <a:solidFill>
-                  <a:schemeClr val="accent1"/>
-                </a:solidFill>
-              </a:rPr>
+              <a:rPr lang="en-US" dirty="0" smtClean="0"/>
               <a:t>Session leader and content created by: Kelsey Chatlosh @</a:t>
             </a:r>
             <a:r>
-              <a:rPr lang="en-US" dirty="0" err="1" smtClean="0">
-                <a:solidFill>
-                  <a:schemeClr val="accent1"/>
-                </a:solidFill>
-              </a:rPr>
+              <a:rPr lang="en-US" dirty="0" err="1" smtClean="0"/>
               <a:t>kchatlosh</a:t>
             </a:r>
-            <a:endParaRPr lang="en-US" dirty="0" smtClean="0">
-              <a:solidFill>
-                <a:schemeClr val="accent1"/>
-              </a:solidFill>
-            </a:endParaRPr>
-          </a:p>
-          <a:p>
-            <a:r>
-              <a:rPr lang="en-US" dirty="0" smtClean="0">
-                <a:solidFill>
-                  <a:schemeClr val="accent1"/>
-                </a:solidFill>
-              </a:rPr>
+            <a:endParaRPr lang="en-US" dirty="0" smtClean="0"/>
+          </a:p>
+          <a:p>
+            <a:r>
+              <a:rPr lang="en-US" dirty="0" smtClean="0"/>
               <a:t>Edited by: Patrick Sweeney @</a:t>
             </a:r>
             <a:r>
-              <a:rPr lang="en-US" dirty="0" err="1" smtClean="0">
-                <a:solidFill>
-                  <a:schemeClr val="accent1"/>
-                </a:solidFill>
-              </a:rPr>
+              <a:rPr lang="en-US" dirty="0" err="1" smtClean="0"/>
               <a:t>pswee</a:t>
             </a:r>
             <a:r>
-              <a:rPr lang="en-US" dirty="0" smtClean="0">
-                <a:solidFill>
-                  <a:schemeClr val="accent1"/>
-                </a:solidFill>
-              </a:rPr>
+              <a:rPr lang="en-US" dirty="0" smtClean="0"/>
               <a:t> and Patrick Smyth @psmyth01</a:t>
             </a:r>
           </a:p>
           <a:p>
             <a:r>
-              <a:rPr lang="en-US" dirty="0" smtClean="0">
-                <a:solidFill>
-                  <a:schemeClr val="accent1"/>
-                </a:solidFill>
-              </a:rPr>
+              <a:rPr lang="en-US" dirty="0" smtClean="0"/>
               <a:t>dhinstitutes.org #DHRI</a:t>
             </a:r>
-            <a:endParaRPr lang="en-US" dirty="0">
-              <a:solidFill>
-                <a:schemeClr val="accent1"/>
-              </a:solidFill>
-            </a:endParaRPr>
+            <a:endParaRPr lang="en-US" dirty="0"/>
           </a:p>
         </p:txBody>
       </p:sp>
@@ -11411,8 +10925,8 @@
         </p:nvSpPr>
         <p:spPr>
           <a:xfrm>
-            <a:off x="5098323" y="6356502"/>
-            <a:ext cx="1995354" cy="369332"/>
+            <a:off x="4594018" y="6356502"/>
+            <a:ext cx="3003964" cy="523220"/>
           </a:xfrm>
           <a:prstGeom prst="rect">
             <a:avLst/>
@@ -11426,18 +10940,10 @@
           <a:p>
             <a:pPr algn="ctr"/>
             <a:r>
-              <a:rPr lang="en-US" dirty="0" smtClean="0">
-                <a:solidFill>
-                  <a:schemeClr val="accent5"/>
-                </a:solidFill>
-              </a:rPr>
+              <a:rPr lang="en-US" sz="2800" dirty="0" smtClean="0"/>
               <a:t>[See: README.MD]</a:t>
             </a:r>
-            <a:endParaRPr lang="en-US" dirty="0">
-              <a:solidFill>
-                <a:schemeClr val="accent5"/>
-              </a:solidFill>
-            </a:endParaRPr>
+            <a:endParaRPr lang="en-US" sz="2800" dirty="0"/>
           </a:p>
         </p:txBody>
       </p:sp>
@@ -11520,8 +11026,8 @@
         </p:nvSpPr>
         <p:spPr>
           <a:xfrm>
-            <a:off x="4943761" y="6356502"/>
-            <a:ext cx="2269211" cy="369332"/>
+            <a:off x="4365782" y="6334780"/>
+            <a:ext cx="3425168" cy="523220"/>
           </a:xfrm>
           <a:prstGeom prst="rect">
             <a:avLst/>
@@ -11534,7 +11040,7 @@
           <a:lstStyle/>
           <a:p>
             <a:r>
-              <a:rPr lang="en-US" dirty="0" smtClean="0">
+              <a:rPr lang="en-US" sz="2800" dirty="0" smtClean="0">
                 <a:solidFill>
                   <a:schemeClr val="tx2"/>
                 </a:solidFill>
@@ -11542,7 +11048,7 @@
               <a:t>[See: </a:t>
             </a:r>
             <a:r>
-              <a:rPr lang="en-US" dirty="0" err="1" smtClean="0">
+              <a:rPr lang="en-US" sz="2800" dirty="0" err="1" smtClean="0">
                 <a:solidFill>
                   <a:schemeClr val="tx2"/>
                 </a:solidFill>
@@ -11550,14 +11056,14 @@
               <a:t>institutional.md</a:t>
             </a:r>
             <a:r>
-              <a:rPr lang="en-US" dirty="0" smtClean="0">
+              <a:rPr lang="en-US" sz="2800" dirty="0" smtClean="0">
                 <a:solidFill>
                   <a:schemeClr val="tx2"/>
                 </a:solidFill>
               </a:rPr>
               <a:t>]</a:t>
             </a:r>
-            <a:endParaRPr lang="en-US" dirty="0">
+            <a:endParaRPr lang="en-US" sz="2800" dirty="0">
               <a:solidFill>
                 <a:schemeClr val="tx2"/>
               </a:solidFill>
@@ -11575,6 +11081,13 @@
   <p:clrMapOvr>
     <a:masterClrMapping/>
   </p:clrMapOvr>
+  <p:timing>
+    <p:tnLst>
+      <p:par>
+        <p:cTn id="1" dur="indefinite" restart="never" nodeType="tmRoot"/>
+      </p:par>
+    </p:tnLst>
+  </p:timing>
 </p:sld>
 </file>
 
@@ -11632,8 +11145,8 @@
         </p:nvSpPr>
         <p:spPr>
           <a:xfrm>
-            <a:off x="4943761" y="6356502"/>
-            <a:ext cx="2269211" cy="369332"/>
+            <a:off x="4383416" y="6356502"/>
+            <a:ext cx="3425168" cy="523220"/>
           </a:xfrm>
           <a:prstGeom prst="rect">
             <a:avLst/>
@@ -11646,34 +11159,18 @@
           <a:lstStyle/>
           <a:p>
             <a:r>
-              <a:rPr lang="en-US" dirty="0" smtClean="0">
-                <a:solidFill>
-                  <a:schemeClr val="accent5"/>
-                </a:solidFill>
-              </a:rPr>
+              <a:rPr lang="en-US" sz="2800" dirty="0" smtClean="0"/>
               <a:t>[See: </a:t>
             </a:r>
             <a:r>
-              <a:rPr lang="en-US" dirty="0" err="1" smtClean="0">
-                <a:solidFill>
-                  <a:schemeClr val="accent5"/>
-                </a:solidFill>
-              </a:rPr>
+              <a:rPr lang="en-US" sz="2800" dirty="0" err="1" smtClean="0"/>
               <a:t>institutional.md</a:t>
             </a:r>
             <a:r>
-              <a:rPr lang="en-US" dirty="0" smtClean="0">
-                <a:solidFill>
-                  <a:schemeClr val="accent5"/>
-                </a:solidFill>
-              </a:rPr>
+              <a:rPr lang="en-US" sz="2800" dirty="0" smtClean="0"/>
               <a:t>]</a:t>
             </a:r>
-            <a:endParaRPr lang="en-US" dirty="0">
-              <a:solidFill>
-                <a:schemeClr val="accent5"/>
-              </a:solidFill>
-            </a:endParaRPr>
+            <a:endParaRPr lang="en-US" sz="2800" dirty="0"/>
           </a:p>
         </p:txBody>
       </p:sp>
@@ -11741,6 +11238,13 @@
   <p:clrMapOvr>
     <a:masterClrMapping/>
   </p:clrMapOvr>
+  <p:timing>
+    <p:tnLst>
+      <p:par>
+        <p:cTn id="1" dur="indefinite" restart="never" nodeType="tmRoot"/>
+      </p:par>
+    </p:tnLst>
+  </p:timing>
 </p:sld>
 </file>
 
@@ -11842,8 +11346,8 @@
         </p:nvSpPr>
         <p:spPr>
           <a:xfrm>
-            <a:off x="5128651" y="6377125"/>
-            <a:ext cx="1934697" cy="369332"/>
+            <a:off x="4644320" y="6334780"/>
+            <a:ext cx="2903359" cy="523220"/>
           </a:xfrm>
           <a:prstGeom prst="rect">
             <a:avLst/>
@@ -11856,34 +11360,18 @@
           <a:lstStyle/>
           <a:p>
             <a:r>
-              <a:rPr lang="en-US" dirty="0" smtClean="0">
-                <a:solidFill>
-                  <a:schemeClr val="accent5"/>
-                </a:solidFill>
-              </a:rPr>
+              <a:rPr lang="en-US" sz="2800" dirty="0" smtClean="0"/>
               <a:t>[See: </a:t>
             </a:r>
             <a:r>
-              <a:rPr lang="en-US" dirty="0" err="1" smtClean="0">
-                <a:solidFill>
-                  <a:schemeClr val="accent5"/>
-                </a:solidFill>
-              </a:rPr>
+              <a:rPr lang="en-US" sz="2800" dirty="0" err="1" smtClean="0"/>
               <a:t>belmont.md</a:t>
             </a:r>
             <a:r>
-              <a:rPr lang="en-US" dirty="0" smtClean="0">
-                <a:solidFill>
-                  <a:schemeClr val="accent5"/>
-                </a:solidFill>
-              </a:rPr>
+              <a:rPr lang="en-US" sz="2800" dirty="0" smtClean="0"/>
               <a:t>]</a:t>
             </a:r>
-            <a:endParaRPr lang="en-US" dirty="0">
-              <a:solidFill>
-                <a:schemeClr val="accent5"/>
-              </a:solidFill>
-            </a:endParaRPr>
+            <a:endParaRPr lang="en-US" sz="2800" dirty="0"/>
           </a:p>
         </p:txBody>
       </p:sp>
@@ -11897,6 +11385,13 @@
   <p:clrMapOvr>
     <a:masterClrMapping/>
   </p:clrMapOvr>
+  <p:timing>
+    <p:tnLst>
+      <p:par>
+        <p:cTn id="1" dur="indefinite" restart="never" nodeType="tmRoot"/>
+      </p:par>
+    </p:tnLst>
+  </p:timing>
 </p:sld>
 </file>
 
@@ -12214,8 +11709,8 @@
         </p:nvSpPr>
         <p:spPr>
           <a:xfrm>
-            <a:off x="5128651" y="6377125"/>
-            <a:ext cx="1934697" cy="369332"/>
+            <a:off x="4645908" y="6334780"/>
+            <a:ext cx="2903359" cy="523220"/>
           </a:xfrm>
           <a:prstGeom prst="rect">
             <a:avLst/>
@@ -12228,34 +11723,18 @@
           <a:lstStyle/>
           <a:p>
             <a:r>
-              <a:rPr lang="en-US" dirty="0" smtClean="0">
-                <a:solidFill>
-                  <a:schemeClr val="accent5"/>
-                </a:solidFill>
-              </a:rPr>
+              <a:rPr lang="en-US" sz="2800" dirty="0" smtClean="0"/>
               <a:t>[See: </a:t>
             </a:r>
             <a:r>
-              <a:rPr lang="en-US" dirty="0" err="1" smtClean="0">
-                <a:solidFill>
-                  <a:schemeClr val="accent5"/>
-                </a:solidFill>
-              </a:rPr>
+              <a:rPr lang="en-US" sz="2800" dirty="0" err="1" smtClean="0"/>
               <a:t>belmont.md</a:t>
             </a:r>
             <a:r>
-              <a:rPr lang="en-US" dirty="0" smtClean="0">
-                <a:solidFill>
-                  <a:schemeClr val="accent5"/>
-                </a:solidFill>
-              </a:rPr>
+              <a:rPr lang="en-US" sz="2800" dirty="0" smtClean="0"/>
               <a:t>]</a:t>
             </a:r>
-            <a:endParaRPr lang="en-US" dirty="0">
-              <a:solidFill>
-                <a:schemeClr val="accent5"/>
-              </a:solidFill>
-            </a:endParaRPr>
+            <a:endParaRPr lang="en-US" sz="2800" dirty="0"/>
           </a:p>
         </p:txBody>
       </p:sp>
@@ -12269,6 +11748,13 @@
   <p:clrMapOvr>
     <a:masterClrMapping/>
   </p:clrMapOvr>
+  <p:timing>
+    <p:tnLst>
+      <p:par>
+        <p:cTn id="1" dur="indefinite" restart="never" nodeType="tmRoot"/>
+      </p:par>
+    </p:tnLst>
+  </p:timing>
 </p:sld>
 </file>
 

</xml_diff>